<commit_message>
#Added "Oportunidades de Mejora" to doc
</commit_message>
<xml_diff>
--- a/docs/Reuniones/Sprint 4/Reunion Formal 20131104/Reunion Formal.pptx
+++ b/docs/Reuniones/Sprint 4/Reunion Formal 20131104/Reunion Formal.pptx
@@ -4070,7 +4070,7 @@
       </p:sp>
       <p:sp>
         <p:nvSpPr>
-          <p:cNvPr id="3" name="Content Placeholder 2"/>
+          <p:cNvPr id="5" name="2 Marcador de contenido"/>
           <p:cNvSpPr>
             <a:spLocks noGrp="1"/>
           </p:cNvSpPr>
@@ -4080,10 +4080,35 @@
         </p:nvSpPr>
         <p:spPr/>
         <p:txBody>
-          <a:bodyPr/>
-          <a:lstStyle/>
-          <a:p>
-            <a:endParaRPr lang="es-AR"/>
+          <a:bodyPr>
+            <a:noAutofit/>
+          </a:bodyPr>
+          <a:lstStyle/>
+          <a:p>
+            <a:pPr lvl="0">
+              <a:buClr>
+                <a:srgbClr val="00B050"/>
+              </a:buClr>
+              <a:buFont typeface="Wingdings" panose="05000000000000000000" pitchFamily="2" charset="2"/>
+              <a:buChar char="ü"/>
+            </a:pPr>
+            <a:r>
+              <a:rPr lang="es-AR" sz="3200" dirty="0" smtClean="0"/>
+              <a:t>Pruebas Funcionales - No usar palabras técnicas, o en inglés. Aclarar con mayor detalle los pasos a </a:t>
+            </a:r>
+            <a:r>
+              <a:rPr lang="es-AR" sz="3200" smtClean="0"/>
+              <a:t>seguir.</a:t>
+            </a:r>
+            <a:endParaRPr lang="es-AR" sz="3200" dirty="0" smtClean="0"/>
+          </a:p>
+          <a:p>
+            <a:pPr lvl="3">
+              <a:buClr>
+                <a:srgbClr val="00B050"/>
+              </a:buClr>
+            </a:pPr>
+            <a:endParaRPr lang="es-AR" sz="2600" dirty="0" smtClean="0"/>
           </a:p>
         </p:txBody>
       </p:sp>

</xml_diff>

<commit_message>
#Added more oportunidades de mejora
</commit_message>
<xml_diff>
--- a/docs/Reuniones/Sprint 4/Reunion Formal 20131104/Reunion Formal.pptx
+++ b/docs/Reuniones/Sprint 4/Reunion Formal 20131104/Reunion Formal.pptx
@@ -4054,7 +4054,12 @@
             <p:ph type="title"/>
           </p:nvPr>
         </p:nvSpPr>
-        <p:spPr/>
+        <p:spPr>
+          <a:xfrm>
+            <a:off x="667130" y="259388"/>
+            <a:ext cx="10772775" cy="1658198"/>
+          </a:xfrm>
+        </p:spPr>
         <p:txBody>
           <a:bodyPr/>
           <a:lstStyle/>
@@ -4078,7 +4083,12 @@
             <p:ph idx="1"/>
           </p:nvPr>
         </p:nvSpPr>
-        <p:spPr/>
+        <p:spPr>
+          <a:xfrm>
+            <a:off x="676656" y="1838036"/>
+            <a:ext cx="10753725" cy="4738255"/>
+          </a:xfrm>
+        </p:spPr>
         <p:txBody>
           <a:bodyPr>
             <a:noAutofit/>
@@ -4094,11 +4104,57 @@
             </a:pPr>
             <a:r>
               <a:rPr lang="es-AR" sz="3200" dirty="0" smtClean="0"/>
-              <a:t>Pruebas Funcionales - No usar palabras técnicas, o en inglés. Aclarar con mayor detalle los pasos a </a:t>
-            </a:r>
-            <a:r>
-              <a:rPr lang="es-AR" sz="3200" smtClean="0"/>
-              <a:t>seguir.</a:t>
+              <a:t>Pruebas Funcionales - No usar palabras técnicas, o en inglés. Aclarar con mayor detalle los pasos a seguir</a:t>
+            </a:r>
+            <a:r>
+              <a:rPr lang="es-AR" sz="3200" dirty="0" smtClean="0"/>
+              <a:t>.</a:t>
+            </a:r>
+          </a:p>
+          <a:p>
+            <a:pPr lvl="0">
+              <a:buClr>
+                <a:srgbClr val="00B050"/>
+              </a:buClr>
+              <a:buFont typeface="Wingdings" panose="05000000000000000000" pitchFamily="2" charset="2"/>
+              <a:buChar char="ü"/>
+            </a:pPr>
+            <a:endParaRPr lang="es-AR" sz="3200" dirty="0" smtClean="0"/>
+          </a:p>
+          <a:p>
+            <a:pPr lvl="0">
+              <a:buClr>
+                <a:srgbClr val="00B050"/>
+              </a:buClr>
+              <a:buFont typeface="Wingdings" panose="05000000000000000000" pitchFamily="2" charset="2"/>
+              <a:buChar char="ü"/>
+            </a:pPr>
+            <a:r>
+              <a:rPr lang="es-AR" sz="3200" dirty="0" smtClean="0"/>
+              <a:t>Identificación de Tareas – Es positivo tener tareas atómicas, pero se debe tener cuidado para que no cambie mucho el alcance. Faltaron identificar tareas en el comienzo del sprint.</a:t>
+            </a:r>
+          </a:p>
+          <a:p>
+            <a:pPr lvl="0">
+              <a:buClr>
+                <a:srgbClr val="00B050"/>
+              </a:buClr>
+              <a:buFont typeface="Wingdings" panose="05000000000000000000" pitchFamily="2" charset="2"/>
+              <a:buChar char="ü"/>
+            </a:pPr>
+            <a:endParaRPr lang="es-AR" sz="3200" dirty="0" smtClean="0"/>
+          </a:p>
+          <a:p>
+            <a:pPr lvl="0">
+              <a:buClr>
+                <a:srgbClr val="00B050"/>
+              </a:buClr>
+              <a:buFont typeface="Wingdings" panose="05000000000000000000" pitchFamily="2" charset="2"/>
+              <a:buChar char="ü"/>
+            </a:pPr>
+            <a:r>
+              <a:rPr lang="es-AR" sz="3200" dirty="0" smtClean="0"/>
+              <a:t>Documento REST API – Fue fundamental para la comunicación del equipo.</a:t>
             </a:r>
             <a:endParaRPr lang="es-AR" sz="3200" dirty="0" smtClean="0"/>
           </a:p>

</xml_diff>

<commit_message>
Item #271. Updated Reunion Formal.pptx and added 20131104MetricAnalysis.xlsx
</commit_message>
<xml_diff>
--- a/docs/Reuniones/Sprint 4/Reunion Formal 20131104/Reunion Formal.pptx
+++ b/docs/Reuniones/Sprint 4/Reunion Formal 20131104/Reunion Formal.pptx
@@ -4104,11 +4104,7 @@
             </a:pPr>
             <a:r>
               <a:rPr lang="es-AR" sz="3200" dirty="0" smtClean="0"/>
-              <a:t>Pruebas Funcionales - No usar palabras técnicas, o en inglés. Aclarar con mayor detalle los pasos a seguir</a:t>
-            </a:r>
-            <a:r>
-              <a:rPr lang="es-AR" sz="3200" dirty="0" smtClean="0"/>
-              <a:t>.</a:t>
+              <a:t>Pruebas Funcionales - No usar palabras técnicas, o en inglés. Aclarar con mayor detalle los pasos a seguir.</a:t>
             </a:r>
           </a:p>
           <a:p>
@@ -4156,7 +4152,6 @@
               <a:rPr lang="es-AR" sz="3200" dirty="0" smtClean="0"/>
               <a:t>Documento REST API – Fue fundamental para la comunicación del equipo.</a:t>
             </a:r>
-            <a:endParaRPr lang="es-AR" sz="3200" dirty="0" smtClean="0"/>
           </a:p>
           <a:p>
             <a:pPr lvl="3">
@@ -4726,25 +4721,30 @@
           </a:p>
         </p:txBody>
       </p:sp>
-      <p:sp>
-        <p:nvSpPr>
-          <p:cNvPr id="3" name="Content Placeholder 2"/>
-          <p:cNvSpPr>
-            <a:spLocks noGrp="1"/>
-          </p:cNvSpPr>
-          <p:nvPr>
-            <p:ph idx="1"/>
-          </p:nvPr>
-        </p:nvSpPr>
-        <p:spPr/>
-        <p:txBody>
-          <a:bodyPr/>
-          <a:lstStyle/>
-          <a:p>
-            <a:endParaRPr lang="es-AR"/>
-          </a:p>
-        </p:txBody>
-      </p:sp>
+      <p:pic>
+        <p:nvPicPr>
+          <p:cNvPr id="4" name="Picture 3"/>
+          <p:cNvPicPr>
+            <a:picLocks noChangeAspect="1"/>
+          </p:cNvPicPr>
+          <p:nvPr/>
+        </p:nvPicPr>
+        <p:blipFill>
+          <a:blip r:embed="rId2"/>
+          <a:stretch>
+            <a:fillRect/>
+          </a:stretch>
+        </p:blipFill>
+        <p:spPr>
+          <a:xfrm>
+            <a:off x="3962643" y="1134191"/>
+            <a:ext cx="4352381" cy="5723809"/>
+          </a:xfrm>
+          <a:prstGeom prst="rect">
+            <a:avLst/>
+          </a:prstGeom>
+        </p:spPr>
+      </p:pic>
     </p:spTree>
     <p:extLst>
       <p:ext uri="{BB962C8B-B14F-4D97-AF65-F5344CB8AC3E}">

</xml_diff>

<commit_message>
Informe de avance with android app Reunion Formal
</commit_message>
<xml_diff>
--- a/docs/Reuniones/Sprint 4/Reunion Formal 20131104/Reunion Formal.pptx
+++ b/docs/Reuniones/Sprint 4/Reunion Formal 20131104/Reunion Formal.pptx
@@ -18,7 +18,14 @@
     <p:sldId id="282" r:id="rId12"/>
     <p:sldId id="283" r:id="rId13"/>
     <p:sldId id="284" r:id="rId14"/>
-    <p:sldId id="276" r:id="rId15"/>
+    <p:sldId id="285" r:id="rId15"/>
+    <p:sldId id="289" r:id="rId16"/>
+    <p:sldId id="291" r:id="rId17"/>
+    <p:sldId id="290" r:id="rId18"/>
+    <p:sldId id="286" r:id="rId19"/>
+    <p:sldId id="287" r:id="rId20"/>
+    <p:sldId id="288" r:id="rId21"/>
+    <p:sldId id="276" r:id="rId22"/>
   </p:sldIdLst>
   <p:sldSz cx="12192000" cy="6858000"/>
   <p:notesSz cx="6858000" cy="9144000"/>
@@ -119,7 +126,7 @@
   </p:defaultTextStyle>
   <p:extLst>
     <p:ext uri="{EFAFB233-063F-42B5-8137-9DF3F51BA10A}">
-      <p15:sldGuideLst xmlns:p15="http://schemas.microsoft.com/office/powerpoint/2012/main">
+      <p15:sldGuideLst xmlns:p15="http://schemas.microsoft.com/office/powerpoint/2012/main" xmlns="">
         <p15:guide id="1" orient="horz" pos="2160">
           <p15:clr>
             <a:srgbClr val="A4A3A4"/>
@@ -400,7 +407,7 @@
             <a:fld id="{146C01B7-3F94-48E0-9801-4B4D2FF8F9CB}" type="slidenum">
               <a:rPr lang="es-AR" smtClean="0"/>
               <a:pPr/>
-              <a:t>‹#›</a:t>
+              <a:t>‹Nº›</a:t>
             </a:fld>
             <a:endParaRPr lang="es-AR"/>
           </a:p>
@@ -409,7 +416,7 @@
     </p:spTree>
     <p:extLst>
       <p:ext uri="{BB962C8B-B14F-4D97-AF65-F5344CB8AC3E}">
-        <p14:creationId xmlns:p14="http://schemas.microsoft.com/office/powerpoint/2010/main" val="783670883"/>
+        <p14:creationId xmlns:p14="http://schemas.microsoft.com/office/powerpoint/2010/main" xmlns="" val="783670883"/>
       </p:ext>
     </p:extLst>
   </p:cSld>
@@ -572,7 +579,7 @@
             <a:fld id="{146C01B7-3F94-48E0-9801-4B4D2FF8F9CB}" type="slidenum">
               <a:rPr lang="es-AR" smtClean="0"/>
               <a:pPr/>
-              <a:t>‹#›</a:t>
+              <a:t>‹Nº›</a:t>
             </a:fld>
             <a:endParaRPr lang="es-AR"/>
           </a:p>
@@ -581,7 +588,7 @@
     </p:spTree>
     <p:extLst>
       <p:ext uri="{BB962C8B-B14F-4D97-AF65-F5344CB8AC3E}">
-        <p14:creationId xmlns:p14="http://schemas.microsoft.com/office/powerpoint/2010/main" val="3362801827"/>
+        <p14:creationId xmlns:p14="http://schemas.microsoft.com/office/powerpoint/2010/main" xmlns="" val="3362801827"/>
       </p:ext>
     </p:extLst>
   </p:cSld>
@@ -754,7 +761,7 @@
             <a:fld id="{146C01B7-3F94-48E0-9801-4B4D2FF8F9CB}" type="slidenum">
               <a:rPr lang="es-AR" smtClean="0"/>
               <a:pPr/>
-              <a:t>‹#›</a:t>
+              <a:t>‹Nº›</a:t>
             </a:fld>
             <a:endParaRPr lang="es-AR"/>
           </a:p>
@@ -763,7 +770,7 @@
     </p:spTree>
     <p:extLst>
       <p:ext uri="{BB962C8B-B14F-4D97-AF65-F5344CB8AC3E}">
-        <p14:creationId xmlns:p14="http://schemas.microsoft.com/office/powerpoint/2010/main" val="1559089465"/>
+        <p14:creationId xmlns:p14="http://schemas.microsoft.com/office/powerpoint/2010/main" xmlns="" val="1559089465"/>
       </p:ext>
     </p:extLst>
   </p:cSld>
@@ -926,7 +933,7 @@
             <a:fld id="{146C01B7-3F94-48E0-9801-4B4D2FF8F9CB}" type="slidenum">
               <a:rPr lang="es-AR" smtClean="0"/>
               <a:pPr/>
-              <a:t>‹#›</a:t>
+              <a:t>‹Nº›</a:t>
             </a:fld>
             <a:endParaRPr lang="es-AR"/>
           </a:p>
@@ -935,7 +942,7 @@
     </p:spTree>
     <p:extLst>
       <p:ext uri="{BB962C8B-B14F-4D97-AF65-F5344CB8AC3E}">
-        <p14:creationId xmlns:p14="http://schemas.microsoft.com/office/powerpoint/2010/main" val="4250054912"/>
+        <p14:creationId xmlns:p14="http://schemas.microsoft.com/office/powerpoint/2010/main" xmlns="" val="4250054912"/>
       </p:ext>
     </p:extLst>
   </p:cSld>
@@ -1184,7 +1191,7 @@
             <a:fld id="{146C01B7-3F94-48E0-9801-4B4D2FF8F9CB}" type="slidenum">
               <a:rPr lang="es-AR" smtClean="0"/>
               <a:pPr/>
-              <a:t>‹#›</a:t>
+              <a:t>‹Nº›</a:t>
             </a:fld>
             <a:endParaRPr lang="es-AR"/>
           </a:p>
@@ -1193,7 +1200,7 @@
     </p:spTree>
     <p:extLst>
       <p:ext uri="{BB962C8B-B14F-4D97-AF65-F5344CB8AC3E}">
-        <p14:creationId xmlns:p14="http://schemas.microsoft.com/office/powerpoint/2010/main" val="2105287886"/>
+        <p14:creationId xmlns:p14="http://schemas.microsoft.com/office/powerpoint/2010/main" xmlns="" val="2105287886"/>
       </p:ext>
     </p:extLst>
   </p:cSld>
@@ -1474,7 +1481,7 @@
             <a:fld id="{146C01B7-3F94-48E0-9801-4B4D2FF8F9CB}" type="slidenum">
               <a:rPr lang="es-AR" smtClean="0"/>
               <a:pPr/>
-              <a:t>‹#›</a:t>
+              <a:t>‹Nº›</a:t>
             </a:fld>
             <a:endParaRPr lang="es-AR"/>
           </a:p>
@@ -1483,7 +1490,7 @@
     </p:spTree>
     <p:extLst>
       <p:ext uri="{BB962C8B-B14F-4D97-AF65-F5344CB8AC3E}">
-        <p14:creationId xmlns:p14="http://schemas.microsoft.com/office/powerpoint/2010/main" val="2999552341"/>
+        <p14:creationId xmlns:p14="http://schemas.microsoft.com/office/powerpoint/2010/main" xmlns="" val="2999552341"/>
       </p:ext>
     </p:extLst>
   </p:cSld>
@@ -1914,7 +1921,7 @@
             <a:fld id="{146C01B7-3F94-48E0-9801-4B4D2FF8F9CB}" type="slidenum">
               <a:rPr lang="es-AR" smtClean="0"/>
               <a:pPr/>
-              <a:t>‹#›</a:t>
+              <a:t>‹Nº›</a:t>
             </a:fld>
             <a:endParaRPr lang="es-AR"/>
           </a:p>
@@ -1923,7 +1930,7 @@
     </p:spTree>
     <p:extLst>
       <p:ext uri="{BB962C8B-B14F-4D97-AF65-F5344CB8AC3E}">
-        <p14:creationId xmlns:p14="http://schemas.microsoft.com/office/powerpoint/2010/main" val="375881571"/>
+        <p14:creationId xmlns:p14="http://schemas.microsoft.com/office/powerpoint/2010/main" xmlns="" val="375881571"/>
       </p:ext>
     </p:extLst>
   </p:cSld>
@@ -2034,7 +2041,7 @@
             <a:fld id="{146C01B7-3F94-48E0-9801-4B4D2FF8F9CB}" type="slidenum">
               <a:rPr lang="es-AR" smtClean="0"/>
               <a:pPr/>
-              <a:t>‹#›</a:t>
+              <a:t>‹Nº›</a:t>
             </a:fld>
             <a:endParaRPr lang="es-AR"/>
           </a:p>
@@ -2043,7 +2050,7 @@
     </p:spTree>
     <p:extLst>
       <p:ext uri="{BB962C8B-B14F-4D97-AF65-F5344CB8AC3E}">
-        <p14:creationId xmlns:p14="http://schemas.microsoft.com/office/powerpoint/2010/main" val="1095840064"/>
+        <p14:creationId xmlns:p14="http://schemas.microsoft.com/office/powerpoint/2010/main" xmlns="" val="1095840064"/>
       </p:ext>
     </p:extLst>
   </p:cSld>
@@ -2131,7 +2138,7 @@
             <a:fld id="{146C01B7-3F94-48E0-9801-4B4D2FF8F9CB}" type="slidenum">
               <a:rPr lang="es-AR" smtClean="0"/>
               <a:pPr/>
-              <a:t>‹#›</a:t>
+              <a:t>‹Nº›</a:t>
             </a:fld>
             <a:endParaRPr lang="es-AR"/>
           </a:p>
@@ -2140,7 +2147,7 @@
     </p:spTree>
     <p:extLst>
       <p:ext uri="{BB962C8B-B14F-4D97-AF65-F5344CB8AC3E}">
-        <p14:creationId xmlns:p14="http://schemas.microsoft.com/office/powerpoint/2010/main" val="1121564704"/>
+        <p14:creationId xmlns:p14="http://schemas.microsoft.com/office/powerpoint/2010/main" xmlns="" val="1121564704"/>
       </p:ext>
     </p:extLst>
   </p:cSld>
@@ -2499,7 +2506,7 @@
             <a:fld id="{146C01B7-3F94-48E0-9801-4B4D2FF8F9CB}" type="slidenum">
               <a:rPr lang="es-AR" smtClean="0"/>
               <a:pPr/>
-              <a:t>‹#›</a:t>
+              <a:t>‹Nº›</a:t>
             </a:fld>
             <a:endParaRPr lang="es-AR"/>
           </a:p>
@@ -2508,7 +2515,7 @@
     </p:spTree>
     <p:extLst>
       <p:ext uri="{BB962C8B-B14F-4D97-AF65-F5344CB8AC3E}">
-        <p14:creationId xmlns:p14="http://schemas.microsoft.com/office/powerpoint/2010/main" val="3858346437"/>
+        <p14:creationId xmlns:p14="http://schemas.microsoft.com/office/powerpoint/2010/main" xmlns="" val="3858346437"/>
       </p:ext>
     </p:extLst>
   </p:cSld>
@@ -2827,7 +2834,7 @@
             <a:fld id="{146C01B7-3F94-48E0-9801-4B4D2FF8F9CB}" type="slidenum">
               <a:rPr lang="es-AR" smtClean="0"/>
               <a:pPr/>
-              <a:t>‹#›</a:t>
+              <a:t>‹Nº›</a:t>
             </a:fld>
             <a:endParaRPr lang="es-AR"/>
           </a:p>
@@ -2836,7 +2843,7 @@
     </p:spTree>
     <p:extLst>
       <p:ext uri="{BB962C8B-B14F-4D97-AF65-F5344CB8AC3E}">
-        <p14:creationId xmlns:p14="http://schemas.microsoft.com/office/powerpoint/2010/main" val="1103777031"/>
+        <p14:creationId xmlns:p14="http://schemas.microsoft.com/office/powerpoint/2010/main" xmlns="" val="1103777031"/>
       </p:ext>
     </p:extLst>
   </p:cSld>
@@ -3082,7 +3089,7 @@
             <a:fld id="{146C01B7-3F94-48E0-9801-4B4D2FF8F9CB}" type="slidenum">
               <a:rPr lang="es-AR" smtClean="0"/>
               <a:pPr/>
-              <a:t>‹#›</a:t>
+              <a:t>‹Nº›</a:t>
             </a:fld>
             <a:endParaRPr lang="es-AR"/>
           </a:p>
@@ -3091,7 +3098,7 @@
     </p:spTree>
     <p:extLst>
       <p:ext uri="{BB962C8B-B14F-4D97-AF65-F5344CB8AC3E}">
-        <p14:creationId xmlns:p14="http://schemas.microsoft.com/office/powerpoint/2010/main" val="1785626056"/>
+        <p14:creationId xmlns:p14="http://schemas.microsoft.com/office/powerpoint/2010/main" xmlns="" val="1785626056"/>
       </p:ext>
     </p:extLst>
   </p:cSld>
@@ -3606,7 +3613,7 @@
     </p:spTree>
     <p:extLst>
       <p:ext uri="{BB962C8B-B14F-4D97-AF65-F5344CB8AC3E}">
-        <p14:creationId xmlns:p14="http://schemas.microsoft.com/office/powerpoint/2010/main" val="4103899004"/>
+        <p14:creationId xmlns:p14="http://schemas.microsoft.com/office/powerpoint/2010/main" xmlns="" val="4103899004"/>
       </p:ext>
     </p:extLst>
   </p:cSld>
@@ -3686,10 +3693,10 @@
           </p:nvPr>
         </p:nvPicPr>
         <p:blipFill>
-          <a:blip r:embed="rId2">
+          <a:blip r:embed="rId2" cstate="print">
             <a:extLst>
               <a:ext uri="{28A0092B-C50C-407E-A947-70E740481C1C}">
-                <a14:useLocalDpi xmlns:a14="http://schemas.microsoft.com/office/drawing/2010/main" val="0"/>
+                <a14:useLocalDpi xmlns:a14="http://schemas.microsoft.com/office/drawing/2010/main" xmlns="" val="0"/>
               </a:ext>
             </a:extLst>
           </a:blip>
@@ -3707,7 +3714,7 @@
     </p:spTree>
     <p:extLst>
       <p:ext uri="{BB962C8B-B14F-4D97-AF65-F5344CB8AC3E}">
-        <p14:creationId xmlns:p14="http://schemas.microsoft.com/office/powerpoint/2010/main" val="546436012"/>
+        <p14:creationId xmlns:p14="http://schemas.microsoft.com/office/powerpoint/2010/main" xmlns="" val="546436012"/>
       </p:ext>
     </p:extLst>
   </p:cSld>
@@ -3787,10 +3794,10 @@
           </p:nvPr>
         </p:nvPicPr>
         <p:blipFill>
-          <a:blip r:embed="rId2">
+          <a:blip r:embed="rId2" cstate="print">
             <a:extLst>
               <a:ext uri="{28A0092B-C50C-407E-A947-70E740481C1C}">
-                <a14:useLocalDpi xmlns:a14="http://schemas.microsoft.com/office/drawing/2010/main" val="0"/>
+                <a14:useLocalDpi xmlns:a14="http://schemas.microsoft.com/office/drawing/2010/main" xmlns="" val="0"/>
               </a:ext>
             </a:extLst>
           </a:blip>
@@ -3808,7 +3815,7 @@
     </p:spTree>
     <p:extLst>
       <p:ext uri="{BB962C8B-B14F-4D97-AF65-F5344CB8AC3E}">
-        <p14:creationId xmlns:p14="http://schemas.microsoft.com/office/powerpoint/2010/main" val="2468076519"/>
+        <p14:creationId xmlns:p14="http://schemas.microsoft.com/office/powerpoint/2010/main" xmlns="" val="2468076519"/>
       </p:ext>
     </p:extLst>
   </p:cSld>
@@ -3888,10 +3895,10 @@
           </p:nvPr>
         </p:nvPicPr>
         <p:blipFill>
-          <a:blip r:embed="rId2">
+          <a:blip r:embed="rId2" cstate="print">
             <a:extLst>
               <a:ext uri="{28A0092B-C50C-407E-A947-70E740481C1C}">
-                <a14:useLocalDpi xmlns:a14="http://schemas.microsoft.com/office/drawing/2010/main" val="0"/>
+                <a14:useLocalDpi xmlns:a14="http://schemas.microsoft.com/office/drawing/2010/main" xmlns="" val="0"/>
               </a:ext>
             </a:extLst>
           </a:blip>
@@ -3909,7 +3916,7 @@
     </p:spTree>
     <p:extLst>
       <p:ext uri="{BB962C8B-B14F-4D97-AF65-F5344CB8AC3E}">
-        <p14:creationId xmlns:p14="http://schemas.microsoft.com/office/powerpoint/2010/main" val="1959318754"/>
+        <p14:creationId xmlns:p14="http://schemas.microsoft.com/office/powerpoint/2010/main" xmlns="" val="1959318754"/>
       </p:ext>
     </p:extLst>
   </p:cSld>
@@ -3989,10 +3996,10 @@
           </p:nvPr>
         </p:nvPicPr>
         <p:blipFill>
-          <a:blip r:embed="rId2">
+          <a:blip r:embed="rId2" cstate="print">
             <a:extLst>
               <a:ext uri="{28A0092B-C50C-407E-A947-70E740481C1C}">
-                <a14:useLocalDpi xmlns:a14="http://schemas.microsoft.com/office/drawing/2010/main" val="0"/>
+                <a14:useLocalDpi xmlns:a14="http://schemas.microsoft.com/office/drawing/2010/main" xmlns="" val="0"/>
               </a:ext>
             </a:extLst>
           </a:blip>
@@ -4010,7 +4017,7 @@
     </p:spTree>
     <p:extLst>
       <p:ext uri="{BB962C8B-B14F-4D97-AF65-F5344CB8AC3E}">
-        <p14:creationId xmlns:p14="http://schemas.microsoft.com/office/powerpoint/2010/main" val="3940033879"/>
+        <p14:creationId xmlns:p14="http://schemas.microsoft.com/office/powerpoint/2010/main" xmlns="" val="3940033879"/>
       </p:ext>
     </p:extLst>
   </p:cSld>
@@ -4056,117 +4063,1103 @@
         </p:nvSpPr>
         <p:spPr>
           <a:xfrm>
-            <a:off x="667130" y="259388"/>
+            <a:off x="657223" y="120842"/>
             <a:ext cx="10772775" cy="1658198"/>
           </a:xfrm>
         </p:spPr>
         <p:txBody>
+          <a:bodyPr>
+            <a:normAutofit/>
+          </a:bodyPr>
+          <a:lstStyle/>
+          <a:p>
+            <a:pPr lvl="0" algn="ctr"/>
+            <a:r>
+              <a:rPr lang="es-AR" dirty="0" smtClean="0"/>
+              <a:t>Mi cuenta (mi información)</a:t>
+            </a:r>
+            <a:endParaRPr lang="es-AR" dirty="0"/>
+          </a:p>
+        </p:txBody>
+      </p:sp>
+      <p:sp>
+        <p:nvSpPr>
+          <p:cNvPr id="5" name="4 Marcador de contenido"/>
+          <p:cNvSpPr>
+            <a:spLocks noGrp="1"/>
+          </p:cNvSpPr>
+          <p:nvPr>
+            <p:ph idx="1"/>
+          </p:nvPr>
+        </p:nvSpPr>
+        <p:spPr>
+          <a:xfrm>
+            <a:off x="6901543" y="2011680"/>
+            <a:ext cx="4528838" cy="3766185"/>
+          </a:xfrm>
+        </p:spPr>
+        <p:txBody>
           <a:bodyPr/>
           <a:lstStyle/>
           <a:p>
-            <a:pPr algn="ctr"/>
-            <a:r>
-              <a:rPr lang="es-AR" dirty="0" smtClean="0"/>
-              <a:t>Oportunidades de Mejora</a:t>
+            <a:r>
+              <a:rPr lang="es-AR" dirty="0" smtClean="0"/>
+              <a:t>Estas imágenes muestran el </a:t>
+            </a:r>
+            <a:r>
+              <a:rPr lang="es-AR" dirty="0" err="1" smtClean="0"/>
+              <a:t>menu</a:t>
+            </a:r>
+            <a:r>
+              <a:rPr lang="es-AR" dirty="0" smtClean="0"/>
+              <a:t> del detalle del usuario.</a:t>
+            </a:r>
+          </a:p>
+          <a:p>
+            <a:r>
+              <a:rPr lang="es-AR" dirty="0" smtClean="0"/>
+              <a:t>En estas ventanas podemos:</a:t>
+            </a:r>
+          </a:p>
+          <a:p>
+            <a:pPr lvl="1">
+              <a:buFont typeface="Arial" pitchFamily="34" charset="0"/>
+              <a:buChar char="•"/>
+            </a:pPr>
+            <a:r>
+              <a:rPr lang="es-AR" dirty="0" smtClean="0"/>
+              <a:t>Iniciar/Cerrar sesión.</a:t>
+            </a:r>
+          </a:p>
+          <a:p>
+            <a:pPr lvl="1">
+              <a:buFont typeface="Arial" pitchFamily="34" charset="0"/>
+              <a:buChar char="•"/>
+            </a:pPr>
+            <a:r>
+              <a:rPr lang="es-AR" dirty="0" smtClean="0"/>
+              <a:t>Ver datos del usuario.</a:t>
+            </a:r>
+          </a:p>
+          <a:p>
+            <a:pPr lvl="1">
+              <a:buFont typeface="Arial" pitchFamily="34" charset="0"/>
+              <a:buChar char="•"/>
+            </a:pPr>
+            <a:r>
+              <a:rPr lang="es-AR" dirty="0" smtClean="0"/>
+              <a:t>Ir al menú de compras y reservas activas del usuario.</a:t>
+            </a:r>
+          </a:p>
+          <a:p>
+            <a:pPr lvl="1">
+              <a:buFont typeface="Arial" pitchFamily="34" charset="0"/>
+              <a:buChar char="•"/>
+            </a:pPr>
+            <a:r>
+              <a:rPr lang="es-AR" dirty="0" smtClean="0"/>
+              <a:t>Compartir en redes sociales.</a:t>
             </a:r>
             <a:endParaRPr lang="es-AR" dirty="0"/>
           </a:p>
         </p:txBody>
       </p:sp>
-      <p:sp>
-        <p:nvSpPr>
-          <p:cNvPr id="5" name="2 Marcador de contenido"/>
-          <p:cNvSpPr>
-            <a:spLocks noGrp="1"/>
-          </p:cNvSpPr>
-          <p:nvPr>
-            <p:ph idx="1"/>
-          </p:nvPr>
-        </p:nvSpPr>
-        <p:spPr>
-          <a:xfrm>
-            <a:off x="676656" y="1838036"/>
-            <a:ext cx="10753725" cy="4738255"/>
-          </a:xfrm>
-        </p:spPr>
-        <p:txBody>
-          <a:bodyPr>
-            <a:noAutofit/>
-          </a:bodyPr>
-          <a:lstStyle/>
-          <a:p>
-            <a:pPr lvl="0">
-              <a:buClr>
-                <a:srgbClr val="00B050"/>
-              </a:buClr>
-              <a:buFont typeface="Wingdings" panose="05000000000000000000" pitchFamily="2" charset="2"/>
-              <a:buChar char="ü"/>
-            </a:pPr>
-            <a:r>
-              <a:rPr lang="es-AR" sz="3200" dirty="0" smtClean="0"/>
-              <a:t>Pruebas Funcionales - No usar palabras técnicas, o en inglés. Aclarar con mayor detalle los pasos a seguir.</a:t>
-            </a:r>
-          </a:p>
-          <a:p>
-            <a:pPr lvl="0">
-              <a:buClr>
-                <a:srgbClr val="00B050"/>
-              </a:buClr>
-              <a:buFont typeface="Wingdings" panose="05000000000000000000" pitchFamily="2" charset="2"/>
-              <a:buChar char="ü"/>
-            </a:pPr>
-            <a:endParaRPr lang="es-AR" sz="3200" dirty="0" smtClean="0"/>
-          </a:p>
-          <a:p>
-            <a:pPr lvl="0">
-              <a:buClr>
-                <a:srgbClr val="00B050"/>
-              </a:buClr>
-              <a:buFont typeface="Wingdings" panose="05000000000000000000" pitchFamily="2" charset="2"/>
-              <a:buChar char="ü"/>
-            </a:pPr>
-            <a:r>
-              <a:rPr lang="es-AR" sz="3200" dirty="0" smtClean="0"/>
-              <a:t>Identificación de Tareas – Es positivo tener tareas atómicas, pero se debe tener cuidado para que no cambie mucho el alcance. Faltaron identificar tareas en el comienzo del sprint.</a:t>
-            </a:r>
-          </a:p>
-          <a:p>
-            <a:pPr lvl="0">
-              <a:buClr>
-                <a:srgbClr val="00B050"/>
-              </a:buClr>
-              <a:buFont typeface="Wingdings" panose="05000000000000000000" pitchFamily="2" charset="2"/>
-              <a:buChar char="ü"/>
-            </a:pPr>
-            <a:endParaRPr lang="es-AR" sz="3200" dirty="0" smtClean="0"/>
-          </a:p>
-          <a:p>
-            <a:pPr lvl="0">
-              <a:buClr>
-                <a:srgbClr val="00B050"/>
-              </a:buClr>
-              <a:buFont typeface="Wingdings" panose="05000000000000000000" pitchFamily="2" charset="2"/>
-              <a:buChar char="ü"/>
-            </a:pPr>
-            <a:r>
-              <a:rPr lang="es-AR" sz="3200" dirty="0" smtClean="0"/>
-              <a:t>Documento REST API – Fue fundamental para la comunicación del equipo.</a:t>
-            </a:r>
-          </a:p>
-          <a:p>
-            <a:pPr lvl="3">
-              <a:buClr>
-                <a:srgbClr val="00B050"/>
-              </a:buClr>
-            </a:pPr>
-            <a:endParaRPr lang="es-AR" sz="2600" dirty="0" smtClean="0"/>
-          </a:p>
-        </p:txBody>
-      </p:sp>
+      <p:pic>
+        <p:nvPicPr>
+          <p:cNvPr id="6" name="Picture 2"/>
+          <p:cNvPicPr>
+            <a:picLocks noChangeAspect="1" noChangeArrowheads="1"/>
+          </p:cNvPicPr>
+          <p:nvPr/>
+        </p:nvPicPr>
+        <p:blipFill>
+          <a:blip r:embed="rId2" cstate="print"/>
+          <a:srcRect/>
+          <a:stretch>
+            <a:fillRect/>
+          </a:stretch>
+        </p:blipFill>
+        <p:spPr bwMode="auto">
+          <a:xfrm>
+            <a:off x="226423" y="1281247"/>
+            <a:ext cx="3048000" cy="5410200"/>
+          </a:xfrm>
+          <a:prstGeom prst="rect">
+            <a:avLst/>
+          </a:prstGeom>
+          <a:noFill/>
+          <a:ln w="9525">
+            <a:noFill/>
+            <a:miter lim="800000"/>
+            <a:headEnd/>
+            <a:tailEnd/>
+          </a:ln>
+        </p:spPr>
+      </p:pic>
+      <p:pic>
+        <p:nvPicPr>
+          <p:cNvPr id="7" name="Picture 3"/>
+          <p:cNvPicPr>
+            <a:picLocks noChangeAspect="1" noChangeArrowheads="1"/>
+          </p:cNvPicPr>
+          <p:nvPr/>
+        </p:nvPicPr>
+        <p:blipFill>
+          <a:blip r:embed="rId3" cstate="print"/>
+          <a:srcRect/>
+          <a:stretch>
+            <a:fillRect/>
+          </a:stretch>
+        </p:blipFill>
+        <p:spPr bwMode="auto">
+          <a:xfrm>
+            <a:off x="3731621" y="1270362"/>
+            <a:ext cx="3048000" cy="5410200"/>
+          </a:xfrm>
+          <a:prstGeom prst="rect">
+            <a:avLst/>
+          </a:prstGeom>
+          <a:noFill/>
+          <a:ln w="9525">
+            <a:noFill/>
+            <a:miter lim="800000"/>
+            <a:headEnd/>
+            <a:tailEnd/>
+          </a:ln>
+        </p:spPr>
+      </p:pic>
     </p:spTree>
     <p:extLst>
       <p:ext uri="{BB962C8B-B14F-4D97-AF65-F5344CB8AC3E}">
-        <p14:creationId xmlns:p14="http://schemas.microsoft.com/office/powerpoint/2010/main" val="4094428205"/>
+        <p14:creationId xmlns:p14="http://schemas.microsoft.com/office/powerpoint/2010/main" xmlns="" val="3940033879"/>
+      </p:ext>
+    </p:extLst>
+  </p:cSld>
+  <p:clrMapOvr>
+    <a:masterClrMapping/>
+  </p:clrMapOvr>
+  <p:timing>
+    <p:tnLst>
+      <p:par>
+        <p:cTn id="1" dur="indefinite" restart="never" nodeType="tmRoot"/>
+      </p:par>
+    </p:tnLst>
+  </p:timing>
+</p:sld>
+</file>
+
+<file path=ppt/slides/slide15.xml><?xml version="1.0" encoding="utf-8"?>
+<p:sld xmlns:a="http://schemas.openxmlformats.org/drawingml/2006/main" xmlns:r="http://schemas.openxmlformats.org/officeDocument/2006/relationships" xmlns:p="http://schemas.openxmlformats.org/presentationml/2006/main">
+  <p:cSld>
+    <p:spTree>
+      <p:nvGrpSpPr>
+        <p:cNvPr id="1" name=""/>
+        <p:cNvGrpSpPr/>
+        <p:nvPr/>
+      </p:nvGrpSpPr>
+      <p:grpSpPr>
+        <a:xfrm>
+          <a:off x="0" y="0"/>
+          <a:ext cx="0" cy="0"/>
+          <a:chOff x="0" y="0"/>
+          <a:chExt cx="0" cy="0"/>
+        </a:xfrm>
+      </p:grpSpPr>
+      <p:sp>
+        <p:nvSpPr>
+          <p:cNvPr id="2" name="Title 1"/>
+          <p:cNvSpPr>
+            <a:spLocks noGrp="1"/>
+          </p:cNvSpPr>
+          <p:nvPr>
+            <p:ph type="title"/>
+          </p:nvPr>
+        </p:nvSpPr>
+        <p:spPr>
+          <a:xfrm>
+            <a:off x="657223" y="120842"/>
+            <a:ext cx="10772775" cy="1658198"/>
+          </a:xfrm>
+        </p:spPr>
+        <p:txBody>
+          <a:bodyPr>
+            <a:normAutofit/>
+          </a:bodyPr>
+          <a:lstStyle/>
+          <a:p>
+            <a:pPr lvl="0" algn="ctr"/>
+            <a:r>
+              <a:rPr lang="es-AR" dirty="0" smtClean="0"/>
+              <a:t>Mi cuenta (Compras y reservas)</a:t>
+            </a:r>
+            <a:endParaRPr lang="es-AR" dirty="0"/>
+          </a:p>
+        </p:txBody>
+      </p:sp>
+      <p:sp>
+        <p:nvSpPr>
+          <p:cNvPr id="5" name="4 Marcador de contenido"/>
+          <p:cNvSpPr>
+            <a:spLocks noGrp="1"/>
+          </p:cNvSpPr>
+          <p:nvPr>
+            <p:ph idx="1"/>
+          </p:nvPr>
+        </p:nvSpPr>
+        <p:spPr>
+          <a:xfrm>
+            <a:off x="6901543" y="1645920"/>
+            <a:ext cx="4528838" cy="4715690"/>
+          </a:xfrm>
+        </p:spPr>
+        <p:txBody>
+          <a:bodyPr/>
+          <a:lstStyle/>
+          <a:p>
+            <a:pPr>
+              <a:buNone/>
+            </a:pPr>
+            <a:r>
+              <a:rPr lang="es-AR" dirty="0" smtClean="0"/>
+              <a:t>Secciones “Compras y Reservas” (imagen izquierda) y “Detalle de Compra/Reserva)” (imagen derecha).</a:t>
+            </a:r>
+          </a:p>
+          <a:p>
+            <a:pPr>
+              <a:buNone/>
+            </a:pPr>
+            <a:r>
+              <a:rPr lang="es-AR" dirty="0" smtClean="0"/>
+              <a:t>Aquí podemos:</a:t>
+            </a:r>
+          </a:p>
+          <a:p>
+            <a:pPr lvl="1">
+              <a:buFont typeface="Arial" pitchFamily="34" charset="0"/>
+              <a:buChar char="•"/>
+            </a:pPr>
+            <a:r>
+              <a:rPr lang="es-AR" dirty="0" smtClean="0"/>
+              <a:t>Ver las compras y reservas del usuario.</a:t>
+            </a:r>
+          </a:p>
+          <a:p>
+            <a:pPr lvl="1">
+              <a:buFont typeface="Arial" pitchFamily="34" charset="0"/>
+              <a:buChar char="•"/>
+            </a:pPr>
+            <a:r>
+              <a:rPr lang="es-AR" dirty="0" smtClean="0"/>
+              <a:t>Cancelar o efectivizar una reserva (funcionalidad no presente en una compra).</a:t>
+            </a:r>
+          </a:p>
+          <a:p>
+            <a:pPr lvl="1">
+              <a:buFont typeface="Arial" pitchFamily="34" charset="0"/>
+              <a:buChar char="•"/>
+            </a:pPr>
+            <a:r>
+              <a:rPr lang="es-AR" dirty="0" smtClean="0"/>
+              <a:t>Compartir en redes sociales.</a:t>
+            </a:r>
+          </a:p>
+          <a:p>
+            <a:pPr lvl="1">
+              <a:buFont typeface="Arial" pitchFamily="34" charset="0"/>
+              <a:buChar char="•"/>
+            </a:pPr>
+            <a:r>
+              <a:rPr lang="es-AR" dirty="0" smtClean="0"/>
+              <a:t>Agregar al calendario la función.</a:t>
+            </a:r>
+          </a:p>
+          <a:p>
+            <a:pPr lvl="1">
+              <a:buFont typeface="Arial" pitchFamily="34" charset="0"/>
+              <a:buChar char="•"/>
+            </a:pPr>
+            <a:r>
+              <a:rPr lang="es-AR" dirty="0" smtClean="0"/>
+              <a:t>Ver el código QR</a:t>
+            </a:r>
+          </a:p>
+          <a:p>
+            <a:pPr lvl="1">
+              <a:buFont typeface="Arial" pitchFamily="34" charset="0"/>
+              <a:buChar char="•"/>
+            </a:pPr>
+            <a:endParaRPr lang="es-AR" dirty="0"/>
+          </a:p>
+        </p:txBody>
+      </p:sp>
+      <p:pic>
+        <p:nvPicPr>
+          <p:cNvPr id="4098" name="Picture 2"/>
+          <p:cNvPicPr>
+            <a:picLocks noChangeAspect="1" noChangeArrowheads="1"/>
+          </p:cNvPicPr>
+          <p:nvPr/>
+        </p:nvPicPr>
+        <p:blipFill>
+          <a:blip r:embed="rId2" cstate="print"/>
+          <a:srcRect/>
+          <a:stretch>
+            <a:fillRect/>
+          </a:stretch>
+        </p:blipFill>
+        <p:spPr bwMode="auto">
+          <a:xfrm>
+            <a:off x="326571" y="1272540"/>
+            <a:ext cx="3048000" cy="5410200"/>
+          </a:xfrm>
+          <a:prstGeom prst="rect">
+            <a:avLst/>
+          </a:prstGeom>
+          <a:noFill/>
+          <a:ln w="9525">
+            <a:noFill/>
+            <a:miter lim="800000"/>
+            <a:headEnd/>
+            <a:tailEnd/>
+          </a:ln>
+        </p:spPr>
+      </p:pic>
+      <p:pic>
+        <p:nvPicPr>
+          <p:cNvPr id="4099" name="Picture 3"/>
+          <p:cNvPicPr>
+            <a:picLocks noChangeAspect="1" noChangeArrowheads="1"/>
+          </p:cNvPicPr>
+          <p:nvPr/>
+        </p:nvPicPr>
+        <p:blipFill>
+          <a:blip r:embed="rId3" cstate="print"/>
+          <a:srcRect/>
+          <a:stretch>
+            <a:fillRect/>
+          </a:stretch>
+        </p:blipFill>
+        <p:spPr bwMode="auto">
+          <a:xfrm>
+            <a:off x="3657600" y="1272540"/>
+            <a:ext cx="3048000" cy="5410200"/>
+          </a:xfrm>
+          <a:prstGeom prst="rect">
+            <a:avLst/>
+          </a:prstGeom>
+          <a:noFill/>
+          <a:ln w="9525">
+            <a:noFill/>
+            <a:miter lim="800000"/>
+            <a:headEnd/>
+            <a:tailEnd/>
+          </a:ln>
+        </p:spPr>
+      </p:pic>
+    </p:spTree>
+    <p:extLst>
+      <p:ext uri="{BB962C8B-B14F-4D97-AF65-F5344CB8AC3E}">
+        <p14:creationId xmlns:p14="http://schemas.microsoft.com/office/powerpoint/2010/main" xmlns="" val="3940033879"/>
+      </p:ext>
+    </p:extLst>
+  </p:cSld>
+  <p:clrMapOvr>
+    <a:masterClrMapping/>
+  </p:clrMapOvr>
+  <p:timing>
+    <p:tnLst>
+      <p:par>
+        <p:cTn id="1" dur="indefinite" restart="never" nodeType="tmRoot"/>
+      </p:par>
+    </p:tnLst>
+  </p:timing>
+</p:sld>
+</file>
+
+<file path=ppt/slides/slide16.xml><?xml version="1.0" encoding="utf-8"?>
+<p:sld xmlns:a="http://schemas.openxmlformats.org/drawingml/2006/main" xmlns:r="http://schemas.openxmlformats.org/officeDocument/2006/relationships" xmlns:p="http://schemas.openxmlformats.org/presentationml/2006/main">
+  <p:cSld>
+    <p:spTree>
+      <p:nvGrpSpPr>
+        <p:cNvPr id="1" name=""/>
+        <p:cNvGrpSpPr/>
+        <p:nvPr/>
+      </p:nvGrpSpPr>
+      <p:grpSpPr>
+        <a:xfrm>
+          <a:off x="0" y="0"/>
+          <a:ext cx="0" cy="0"/>
+          <a:chOff x="0" y="0"/>
+          <a:chExt cx="0" cy="0"/>
+        </a:xfrm>
+      </p:grpSpPr>
+      <p:sp>
+        <p:nvSpPr>
+          <p:cNvPr id="2" name="Title 1"/>
+          <p:cNvSpPr>
+            <a:spLocks noGrp="1"/>
+          </p:cNvSpPr>
+          <p:nvPr>
+            <p:ph type="title"/>
+          </p:nvPr>
+        </p:nvSpPr>
+        <p:spPr>
+          <a:xfrm>
+            <a:off x="657223" y="120842"/>
+            <a:ext cx="10772775" cy="1658198"/>
+          </a:xfrm>
+        </p:spPr>
+        <p:txBody>
+          <a:bodyPr>
+            <a:normAutofit/>
+          </a:bodyPr>
+          <a:lstStyle/>
+          <a:p>
+            <a:pPr lvl="0" algn="ctr"/>
+            <a:r>
+              <a:rPr lang="es-AR" dirty="0" smtClean="0"/>
+              <a:t>Código QR</a:t>
+            </a:r>
+            <a:endParaRPr lang="es-AR" dirty="0"/>
+          </a:p>
+        </p:txBody>
+      </p:sp>
+      <p:sp>
+        <p:nvSpPr>
+          <p:cNvPr id="5" name="4 Marcador de contenido"/>
+          <p:cNvSpPr>
+            <a:spLocks noGrp="1"/>
+          </p:cNvSpPr>
+          <p:nvPr>
+            <p:ph idx="1"/>
+          </p:nvPr>
+        </p:nvSpPr>
+        <p:spPr>
+          <a:xfrm>
+            <a:off x="5943600" y="2508068"/>
+            <a:ext cx="4480560" cy="3853541"/>
+          </a:xfrm>
+        </p:spPr>
+        <p:txBody>
+          <a:bodyPr/>
+          <a:lstStyle/>
+          <a:p>
+            <a:pPr>
+              <a:buNone/>
+            </a:pPr>
+            <a:r>
+              <a:rPr lang="es-AR" dirty="0" smtClean="0"/>
+              <a:t>En el detalle de una compra o una reserva podemos ver el código QR que genera el servidor para dicha función.</a:t>
+            </a:r>
+          </a:p>
+          <a:p>
+            <a:pPr lvl="1">
+              <a:buFont typeface="Arial" pitchFamily="34" charset="0"/>
+              <a:buChar char="•"/>
+            </a:pPr>
+            <a:endParaRPr lang="es-AR" dirty="0"/>
+          </a:p>
+        </p:txBody>
+      </p:sp>
+      <p:pic>
+        <p:nvPicPr>
+          <p:cNvPr id="6146" name="Picture 2"/>
+          <p:cNvPicPr>
+            <a:picLocks noChangeAspect="1" noChangeArrowheads="1"/>
+          </p:cNvPicPr>
+          <p:nvPr/>
+        </p:nvPicPr>
+        <p:blipFill>
+          <a:blip r:embed="rId2" cstate="print"/>
+          <a:srcRect/>
+          <a:stretch>
+            <a:fillRect/>
+          </a:stretch>
+        </p:blipFill>
+        <p:spPr bwMode="auto">
+          <a:xfrm>
+            <a:off x="1750423" y="1168036"/>
+            <a:ext cx="3048000" cy="5410200"/>
+          </a:xfrm>
+          <a:prstGeom prst="rect">
+            <a:avLst/>
+          </a:prstGeom>
+          <a:noFill/>
+          <a:ln w="9525">
+            <a:noFill/>
+            <a:miter lim="800000"/>
+            <a:headEnd/>
+            <a:tailEnd/>
+          </a:ln>
+        </p:spPr>
+      </p:pic>
+    </p:spTree>
+    <p:extLst>
+      <p:ext uri="{BB962C8B-B14F-4D97-AF65-F5344CB8AC3E}">
+        <p14:creationId xmlns:p14="http://schemas.microsoft.com/office/powerpoint/2010/main" xmlns="" val="3940033879"/>
+      </p:ext>
+    </p:extLst>
+  </p:cSld>
+  <p:clrMapOvr>
+    <a:masterClrMapping/>
+  </p:clrMapOvr>
+  <p:timing>
+    <p:tnLst>
+      <p:par>
+        <p:cTn id="1" dur="indefinite" restart="never" nodeType="tmRoot"/>
+      </p:par>
+    </p:tnLst>
+  </p:timing>
+</p:sld>
+</file>
+
+<file path=ppt/slides/slide17.xml><?xml version="1.0" encoding="utf-8"?>
+<p:sld xmlns:a="http://schemas.openxmlformats.org/drawingml/2006/main" xmlns:r="http://schemas.openxmlformats.org/officeDocument/2006/relationships" xmlns:p="http://schemas.openxmlformats.org/presentationml/2006/main">
+  <p:cSld>
+    <p:spTree>
+      <p:nvGrpSpPr>
+        <p:cNvPr id="1" name=""/>
+        <p:cNvGrpSpPr/>
+        <p:nvPr/>
+      </p:nvGrpSpPr>
+      <p:grpSpPr>
+        <a:xfrm>
+          <a:off x="0" y="0"/>
+          <a:ext cx="0" cy="0"/>
+          <a:chOff x="0" y="0"/>
+          <a:chExt cx="0" cy="0"/>
+        </a:xfrm>
+      </p:grpSpPr>
+      <p:sp>
+        <p:nvSpPr>
+          <p:cNvPr id="2" name="Title 1"/>
+          <p:cNvSpPr>
+            <a:spLocks noGrp="1"/>
+          </p:cNvSpPr>
+          <p:nvPr>
+            <p:ph type="title"/>
+          </p:nvPr>
+        </p:nvSpPr>
+        <p:spPr>
+          <a:xfrm>
+            <a:off x="657223" y="120842"/>
+            <a:ext cx="10772775" cy="1658198"/>
+          </a:xfrm>
+        </p:spPr>
+        <p:txBody>
+          <a:bodyPr>
+            <a:normAutofit/>
+          </a:bodyPr>
+          <a:lstStyle/>
+          <a:p>
+            <a:pPr lvl="0" algn="ctr"/>
+            <a:r>
+              <a:rPr lang="es-AR" dirty="0" smtClean="0"/>
+              <a:t>Calendario</a:t>
+            </a:r>
+            <a:endParaRPr lang="es-AR" dirty="0"/>
+          </a:p>
+        </p:txBody>
+      </p:sp>
+      <p:sp>
+        <p:nvSpPr>
+          <p:cNvPr id="5" name="4 Marcador de contenido"/>
+          <p:cNvSpPr>
+            <a:spLocks noGrp="1"/>
+          </p:cNvSpPr>
+          <p:nvPr>
+            <p:ph idx="1"/>
+          </p:nvPr>
+        </p:nvSpPr>
+        <p:spPr>
+          <a:xfrm>
+            <a:off x="6901543" y="1645920"/>
+            <a:ext cx="4528838" cy="4715690"/>
+          </a:xfrm>
+        </p:spPr>
+        <p:txBody>
+          <a:bodyPr/>
+          <a:lstStyle/>
+          <a:p>
+            <a:pPr>
+              <a:buNone/>
+            </a:pPr>
+            <a:r>
+              <a:rPr lang="es-AR" dirty="0" smtClean="0"/>
+              <a:t>En la imagen izquierda podemos ver el formulario nativo para agregar eventos al calendario.</a:t>
+            </a:r>
+          </a:p>
+          <a:p>
+            <a:pPr>
+              <a:buNone/>
+            </a:pPr>
+            <a:endParaRPr lang="es-AR" dirty="0" smtClean="0"/>
+          </a:p>
+          <a:p>
+            <a:pPr>
+              <a:buNone/>
+            </a:pPr>
+            <a:r>
+              <a:rPr lang="es-AR" dirty="0" smtClean="0"/>
+              <a:t>En la imagen de la derecha vemos el evento agregado al mismo.</a:t>
+            </a:r>
+          </a:p>
+          <a:p>
+            <a:pPr lvl="1">
+              <a:buFont typeface="Arial" pitchFamily="34" charset="0"/>
+              <a:buChar char="•"/>
+            </a:pPr>
+            <a:endParaRPr lang="es-AR" dirty="0"/>
+          </a:p>
+        </p:txBody>
+      </p:sp>
+      <p:pic>
+        <p:nvPicPr>
+          <p:cNvPr id="5122" name="Picture 2"/>
+          <p:cNvPicPr>
+            <a:picLocks noChangeAspect="1" noChangeArrowheads="1"/>
+          </p:cNvPicPr>
+          <p:nvPr/>
+        </p:nvPicPr>
+        <p:blipFill>
+          <a:blip r:embed="rId2" cstate="print"/>
+          <a:srcRect/>
+          <a:stretch>
+            <a:fillRect/>
+          </a:stretch>
+        </p:blipFill>
+        <p:spPr bwMode="auto">
+          <a:xfrm>
+            <a:off x="287383" y="1246414"/>
+            <a:ext cx="3048000" cy="5410200"/>
+          </a:xfrm>
+          <a:prstGeom prst="rect">
+            <a:avLst/>
+          </a:prstGeom>
+          <a:noFill/>
+          <a:ln w="9525">
+            <a:noFill/>
+            <a:miter lim="800000"/>
+            <a:headEnd/>
+            <a:tailEnd/>
+          </a:ln>
+        </p:spPr>
+      </p:pic>
+      <p:pic>
+        <p:nvPicPr>
+          <p:cNvPr id="5123" name="Picture 3"/>
+          <p:cNvPicPr>
+            <a:picLocks noChangeAspect="1" noChangeArrowheads="1"/>
+          </p:cNvPicPr>
+          <p:nvPr/>
+        </p:nvPicPr>
+        <p:blipFill>
+          <a:blip r:embed="rId3" cstate="print"/>
+          <a:srcRect/>
+          <a:stretch>
+            <a:fillRect/>
+          </a:stretch>
+        </p:blipFill>
+        <p:spPr bwMode="auto">
+          <a:xfrm>
+            <a:off x="3605349" y="1233351"/>
+            <a:ext cx="3048000" cy="5410200"/>
+          </a:xfrm>
+          <a:prstGeom prst="rect">
+            <a:avLst/>
+          </a:prstGeom>
+          <a:noFill/>
+          <a:ln w="9525">
+            <a:noFill/>
+            <a:miter lim="800000"/>
+            <a:headEnd/>
+            <a:tailEnd/>
+          </a:ln>
+        </p:spPr>
+      </p:pic>
+    </p:spTree>
+    <p:extLst>
+      <p:ext uri="{BB962C8B-B14F-4D97-AF65-F5344CB8AC3E}">
+        <p14:creationId xmlns:p14="http://schemas.microsoft.com/office/powerpoint/2010/main" xmlns="" val="3940033879"/>
+      </p:ext>
+    </p:extLst>
+  </p:cSld>
+  <p:clrMapOvr>
+    <a:masterClrMapping/>
+  </p:clrMapOvr>
+  <p:timing>
+    <p:tnLst>
+      <p:par>
+        <p:cTn id="1" dur="indefinite" restart="never" nodeType="tmRoot"/>
+      </p:par>
+    </p:tnLst>
+  </p:timing>
+</p:sld>
+</file>
+
+<file path=ppt/slides/slide18.xml><?xml version="1.0" encoding="utf-8"?>
+<p:sld xmlns:a="http://schemas.openxmlformats.org/drawingml/2006/main" xmlns:r="http://schemas.openxmlformats.org/officeDocument/2006/relationships" xmlns:p="http://schemas.openxmlformats.org/presentationml/2006/main">
+  <p:cSld>
+    <p:spTree>
+      <p:nvGrpSpPr>
+        <p:cNvPr id="1" name=""/>
+        <p:cNvGrpSpPr/>
+        <p:nvPr/>
+      </p:nvGrpSpPr>
+      <p:grpSpPr>
+        <a:xfrm>
+          <a:off x="0" y="0"/>
+          <a:ext cx="0" cy="0"/>
+          <a:chOff x="0" y="0"/>
+          <a:chExt cx="0" cy="0"/>
+        </a:xfrm>
+      </p:grpSpPr>
+      <p:sp>
+        <p:nvSpPr>
+          <p:cNvPr id="2" name="Title 1"/>
+          <p:cNvSpPr>
+            <a:spLocks noGrp="1"/>
+          </p:cNvSpPr>
+          <p:nvPr>
+            <p:ph type="title"/>
+          </p:nvPr>
+        </p:nvSpPr>
+        <p:spPr>
+          <a:xfrm>
+            <a:off x="657223" y="120842"/>
+            <a:ext cx="10772775" cy="1658198"/>
+          </a:xfrm>
+        </p:spPr>
+        <p:txBody>
+          <a:bodyPr>
+            <a:normAutofit/>
+          </a:bodyPr>
+          <a:lstStyle/>
+          <a:p>
+            <a:pPr lvl="0" algn="ctr"/>
+            <a:r>
+              <a:rPr lang="es-AR" dirty="0" smtClean="0"/>
+              <a:t>Selección de butacas</a:t>
+            </a:r>
+            <a:endParaRPr lang="es-AR" dirty="0"/>
+          </a:p>
+        </p:txBody>
+      </p:sp>
+      <p:sp>
+        <p:nvSpPr>
+          <p:cNvPr id="5" name="4 Marcador de contenido"/>
+          <p:cNvSpPr>
+            <a:spLocks noGrp="1"/>
+          </p:cNvSpPr>
+          <p:nvPr>
+            <p:ph idx="1"/>
+          </p:nvPr>
+        </p:nvSpPr>
+        <p:spPr>
+          <a:xfrm>
+            <a:off x="5212080" y="1593670"/>
+            <a:ext cx="6218301" cy="4184196"/>
+          </a:xfrm>
+        </p:spPr>
+        <p:txBody>
+          <a:bodyPr>
+            <a:normAutofit/>
+          </a:bodyPr>
+          <a:lstStyle/>
+          <a:p>
+            <a:pPr>
+              <a:buNone/>
+            </a:pPr>
+            <a:r>
+              <a:rPr lang="es-AR" dirty="0" smtClean="0"/>
+              <a:t>En la ventana de selección </a:t>
+            </a:r>
+            <a:r>
+              <a:rPr lang="es-AR" dirty="0" smtClean="0"/>
+              <a:t>de butacas </a:t>
+            </a:r>
+            <a:r>
+              <a:rPr lang="es-AR" dirty="0" smtClean="0"/>
+              <a:t>(primer paso de la compra/reserva de entradas) podemos ver el mapa de la sala con:</a:t>
+            </a:r>
+          </a:p>
+          <a:p>
+            <a:pPr lvl="1">
+              <a:buFont typeface="Arial" pitchFamily="34" charset="0"/>
+              <a:buChar char="•"/>
+            </a:pPr>
+            <a:r>
+              <a:rPr lang="es-AR" dirty="0" smtClean="0"/>
+              <a:t>Butacas ocupadas (rojas).</a:t>
+            </a:r>
+          </a:p>
+          <a:p>
+            <a:pPr lvl="1">
+              <a:buFont typeface="Arial" pitchFamily="34" charset="0"/>
+              <a:buChar char="•"/>
+            </a:pPr>
+            <a:r>
+              <a:rPr lang="es-AR" dirty="0" smtClean="0"/>
+              <a:t>Butacas libres (grises).</a:t>
+            </a:r>
+          </a:p>
+          <a:p>
+            <a:pPr lvl="1">
+              <a:buFont typeface="Arial" pitchFamily="34" charset="0"/>
+              <a:buChar char="•"/>
+            </a:pPr>
+            <a:r>
+              <a:rPr lang="es-AR" dirty="0" smtClean="0"/>
+              <a:t>Butacas seleccionadas (verdes).</a:t>
+            </a:r>
+          </a:p>
+          <a:p>
+            <a:pPr lvl="1">
+              <a:buFont typeface="Arial" pitchFamily="34" charset="0"/>
+              <a:buChar char="•"/>
+            </a:pPr>
+            <a:r>
+              <a:rPr lang="es-AR" dirty="0" smtClean="0"/>
+              <a:t>Un pequeño detalle de la información de la función.</a:t>
+            </a:r>
+          </a:p>
+          <a:p>
+            <a:pPr lvl="1">
+              <a:buFont typeface="Arial" pitchFamily="34" charset="0"/>
+              <a:buChar char="•"/>
+            </a:pPr>
+            <a:r>
+              <a:rPr lang="es-AR" dirty="0" smtClean="0"/>
+              <a:t>L</a:t>
+            </a:r>
+            <a:r>
+              <a:rPr lang="es-AR" dirty="0" smtClean="0"/>
+              <a:t>a cantidad de butacas seleccionadas.</a:t>
+            </a:r>
+            <a:endParaRPr lang="es-AR" dirty="0"/>
+          </a:p>
+        </p:txBody>
+      </p:sp>
+      <p:pic>
+        <p:nvPicPr>
+          <p:cNvPr id="1026" name="Picture 2"/>
+          <p:cNvPicPr>
+            <a:picLocks noChangeAspect="1" noChangeArrowheads="1"/>
+          </p:cNvPicPr>
+          <p:nvPr/>
+        </p:nvPicPr>
+        <p:blipFill>
+          <a:blip r:embed="rId2" cstate="print"/>
+          <a:srcRect/>
+          <a:stretch>
+            <a:fillRect/>
+          </a:stretch>
+        </p:blipFill>
+        <p:spPr bwMode="auto">
+          <a:xfrm>
+            <a:off x="1358537" y="1259478"/>
+            <a:ext cx="3048000" cy="5410200"/>
+          </a:xfrm>
+          <a:prstGeom prst="rect">
+            <a:avLst/>
+          </a:prstGeom>
+          <a:noFill/>
+          <a:ln w="9525">
+            <a:noFill/>
+            <a:miter lim="800000"/>
+            <a:headEnd/>
+            <a:tailEnd/>
+          </a:ln>
+        </p:spPr>
+      </p:pic>
+    </p:spTree>
+    <p:extLst>
+      <p:ext uri="{BB962C8B-B14F-4D97-AF65-F5344CB8AC3E}">
+        <p14:creationId xmlns:p14="http://schemas.microsoft.com/office/powerpoint/2010/main" xmlns="" val="3940033879"/>
+      </p:ext>
+    </p:extLst>
+  </p:cSld>
+  <p:clrMapOvr>
+    <a:masterClrMapping/>
+  </p:clrMapOvr>
+  <p:timing>
+    <p:tnLst>
+      <p:par>
+        <p:cTn id="1" dur="indefinite" restart="never" nodeType="tmRoot"/>
+      </p:par>
+    </p:tnLst>
+  </p:timing>
+</p:sld>
+</file>
+
+<file path=ppt/slides/slide19.xml><?xml version="1.0" encoding="utf-8"?>
+<p:sld xmlns:a="http://schemas.openxmlformats.org/drawingml/2006/main" xmlns:r="http://schemas.openxmlformats.org/officeDocument/2006/relationships" xmlns:p="http://schemas.openxmlformats.org/presentationml/2006/main">
+  <p:cSld>
+    <p:spTree>
+      <p:nvGrpSpPr>
+        <p:cNvPr id="1" name=""/>
+        <p:cNvGrpSpPr/>
+        <p:nvPr/>
+      </p:nvGrpSpPr>
+      <p:grpSpPr>
+        <a:xfrm>
+          <a:off x="0" y="0"/>
+          <a:ext cx="0" cy="0"/>
+          <a:chOff x="0" y="0"/>
+          <a:chExt cx="0" cy="0"/>
+        </a:xfrm>
+      </p:grpSpPr>
+      <p:sp>
+        <p:nvSpPr>
+          <p:cNvPr id="2" name="Title 1"/>
+          <p:cNvSpPr>
+            <a:spLocks noGrp="1"/>
+          </p:cNvSpPr>
+          <p:nvPr>
+            <p:ph type="title"/>
+          </p:nvPr>
+        </p:nvSpPr>
+        <p:spPr>
+          <a:xfrm>
+            <a:off x="657223" y="120842"/>
+            <a:ext cx="10772775" cy="1658198"/>
+          </a:xfrm>
+        </p:spPr>
+        <p:txBody>
+          <a:bodyPr>
+            <a:normAutofit/>
+          </a:bodyPr>
+          <a:lstStyle/>
+          <a:p>
+            <a:pPr lvl="0" algn="ctr"/>
+            <a:r>
+              <a:rPr lang="es-AR" dirty="0" smtClean="0"/>
+              <a:t>Selección de promociones</a:t>
+            </a:r>
+            <a:endParaRPr lang="es-AR" dirty="0"/>
+          </a:p>
+        </p:txBody>
+      </p:sp>
+      <p:sp>
+        <p:nvSpPr>
+          <p:cNvPr id="5" name="4 Marcador de contenido"/>
+          <p:cNvSpPr>
+            <a:spLocks noGrp="1"/>
+          </p:cNvSpPr>
+          <p:nvPr>
+            <p:ph idx="1"/>
+          </p:nvPr>
+        </p:nvSpPr>
+        <p:spPr>
+          <a:xfrm>
+            <a:off x="5159829" y="1698172"/>
+            <a:ext cx="6270552" cy="4079694"/>
+          </a:xfrm>
+        </p:spPr>
+        <p:txBody>
+          <a:bodyPr/>
+          <a:lstStyle/>
+          <a:p>
+            <a:pPr>
+              <a:buNone/>
+            </a:pPr>
+            <a:r>
+              <a:rPr lang="es-AR" dirty="0" smtClean="0"/>
+              <a:t>En la ventana de selección de </a:t>
+            </a:r>
+            <a:r>
+              <a:rPr lang="es-AR" dirty="0" smtClean="0"/>
+              <a:t>promociones (segundo paso </a:t>
+            </a:r>
+            <a:r>
+              <a:rPr lang="es-AR" dirty="0" smtClean="0"/>
+              <a:t>de la compra/reserva de entradas) </a:t>
+            </a:r>
+            <a:r>
+              <a:rPr lang="es-AR" dirty="0" smtClean="0"/>
+              <a:t>podemos:</a:t>
+            </a:r>
+            <a:endParaRPr lang="es-AR" dirty="0" smtClean="0"/>
+          </a:p>
+          <a:p>
+            <a:pPr lvl="1">
+              <a:buFont typeface="Arial" pitchFamily="34" charset="0"/>
+              <a:buChar char="•"/>
+            </a:pPr>
+            <a:r>
+              <a:rPr lang="es-AR" dirty="0" smtClean="0"/>
+              <a:t>El detalle de la compra/reserva.</a:t>
+            </a:r>
+          </a:p>
+          <a:p>
+            <a:pPr lvl="1">
+              <a:buFont typeface="Arial" pitchFamily="34" charset="0"/>
+              <a:buChar char="•"/>
+            </a:pPr>
+            <a:r>
+              <a:rPr lang="es-AR" dirty="0" smtClean="0"/>
+              <a:t>Un listado con todas las promociones para poder seleccionar los tipos y cantidades.</a:t>
+            </a:r>
+          </a:p>
+          <a:p>
+            <a:pPr lvl="1">
+              <a:buFont typeface="Arial" pitchFamily="34" charset="0"/>
+              <a:buChar char="•"/>
+            </a:pPr>
+            <a:r>
+              <a:rPr lang="es-AR" dirty="0" smtClean="0"/>
+              <a:t>Los botones de las acciones compra, reserva y cancelación de la operación.</a:t>
+            </a:r>
+            <a:endParaRPr lang="es-AR" dirty="0" smtClean="0"/>
+          </a:p>
+          <a:p>
+            <a:endParaRPr lang="es-AR" dirty="0" smtClean="0"/>
+          </a:p>
+          <a:p>
+            <a:r>
+              <a:rPr lang="es-AR" dirty="0" smtClean="0"/>
+              <a:t>Esta ventana representa el ultimo paso de la reserva.</a:t>
+            </a:r>
+            <a:endParaRPr lang="es-AR" dirty="0"/>
+          </a:p>
+        </p:txBody>
+      </p:sp>
+      <p:pic>
+        <p:nvPicPr>
+          <p:cNvPr id="2050" name="Picture 2"/>
+          <p:cNvPicPr>
+            <a:picLocks noChangeAspect="1" noChangeArrowheads="1"/>
+          </p:cNvPicPr>
+          <p:nvPr/>
+        </p:nvPicPr>
+        <p:blipFill>
+          <a:blip r:embed="rId2" cstate="print"/>
+          <a:srcRect/>
+          <a:stretch>
+            <a:fillRect/>
+          </a:stretch>
+        </p:blipFill>
+        <p:spPr bwMode="auto">
+          <a:xfrm>
+            <a:off x="1162594" y="1259477"/>
+            <a:ext cx="3048000" cy="5410200"/>
+          </a:xfrm>
+          <a:prstGeom prst="rect">
+            <a:avLst/>
+          </a:prstGeom>
+          <a:noFill/>
+          <a:ln w="9525">
+            <a:noFill/>
+            <a:miter lim="800000"/>
+            <a:headEnd/>
+            <a:tailEnd/>
+          </a:ln>
+        </p:spPr>
+      </p:pic>
+    </p:spTree>
+    <p:extLst>
+      <p:ext uri="{BB962C8B-B14F-4D97-AF65-F5344CB8AC3E}">
+        <p14:creationId xmlns:p14="http://schemas.microsoft.com/office/powerpoint/2010/main" xmlns="" val="3940033879"/>
       </p:ext>
     </p:extLst>
   </p:cSld>
@@ -4370,7 +5363,338 @@
     </p:spTree>
     <p:extLst>
       <p:ext uri="{BB962C8B-B14F-4D97-AF65-F5344CB8AC3E}">
-        <p14:creationId xmlns:p14="http://schemas.microsoft.com/office/powerpoint/2010/main" val="3019863904"/>
+        <p14:creationId xmlns:p14="http://schemas.microsoft.com/office/powerpoint/2010/main" xmlns="" val="3019863904"/>
+      </p:ext>
+    </p:extLst>
+  </p:cSld>
+  <p:clrMapOvr>
+    <a:masterClrMapping/>
+  </p:clrMapOvr>
+  <p:timing>
+    <p:tnLst>
+      <p:par>
+        <p:cTn id="1" dur="indefinite" restart="never" nodeType="tmRoot"/>
+      </p:par>
+    </p:tnLst>
+  </p:timing>
+</p:sld>
+</file>
+
+<file path=ppt/slides/slide20.xml><?xml version="1.0" encoding="utf-8"?>
+<p:sld xmlns:a="http://schemas.openxmlformats.org/drawingml/2006/main" xmlns:r="http://schemas.openxmlformats.org/officeDocument/2006/relationships" xmlns:p="http://schemas.openxmlformats.org/presentationml/2006/main">
+  <p:cSld>
+    <p:spTree>
+      <p:nvGrpSpPr>
+        <p:cNvPr id="1" name=""/>
+        <p:cNvGrpSpPr/>
+        <p:nvPr/>
+      </p:nvGrpSpPr>
+      <p:grpSpPr>
+        <a:xfrm>
+          <a:off x="0" y="0"/>
+          <a:ext cx="0" cy="0"/>
+          <a:chOff x="0" y="0"/>
+          <a:chExt cx="0" cy="0"/>
+        </a:xfrm>
+      </p:grpSpPr>
+      <p:sp>
+        <p:nvSpPr>
+          <p:cNvPr id="2" name="Title 1"/>
+          <p:cNvSpPr>
+            <a:spLocks noGrp="1"/>
+          </p:cNvSpPr>
+          <p:nvPr>
+            <p:ph type="title"/>
+          </p:nvPr>
+        </p:nvSpPr>
+        <p:spPr>
+          <a:xfrm>
+            <a:off x="657223" y="120842"/>
+            <a:ext cx="10772775" cy="1658198"/>
+          </a:xfrm>
+        </p:spPr>
+        <p:txBody>
+          <a:bodyPr>
+            <a:normAutofit/>
+          </a:bodyPr>
+          <a:lstStyle/>
+          <a:p>
+            <a:pPr lvl="0" algn="ctr"/>
+            <a:r>
+              <a:rPr lang="es-AR" dirty="0" smtClean="0"/>
+              <a:t>Compra</a:t>
+            </a:r>
+            <a:endParaRPr lang="es-AR" dirty="0"/>
+          </a:p>
+        </p:txBody>
+      </p:sp>
+      <p:sp>
+        <p:nvSpPr>
+          <p:cNvPr id="5" name="4 Marcador de contenido"/>
+          <p:cNvSpPr>
+            <a:spLocks noGrp="1"/>
+          </p:cNvSpPr>
+          <p:nvPr>
+            <p:ph idx="1"/>
+          </p:nvPr>
+        </p:nvSpPr>
+        <p:spPr>
+          <a:xfrm>
+            <a:off x="6901543" y="2011680"/>
+            <a:ext cx="4528838" cy="3766185"/>
+          </a:xfrm>
+        </p:spPr>
+        <p:txBody>
+          <a:bodyPr/>
+          <a:lstStyle/>
+          <a:p>
+            <a:r>
+              <a:rPr lang="es-AR" dirty="0" smtClean="0"/>
+              <a:t>El ultimo paso de la compra es el que vemos en estas imágenes.</a:t>
+            </a:r>
+          </a:p>
+          <a:p>
+            <a:r>
+              <a:rPr lang="es-AR" dirty="0" smtClean="0"/>
+              <a:t>Una ventana que pide los datos de la tarjeta del usuario.</a:t>
+            </a:r>
+          </a:p>
+          <a:p>
+            <a:endParaRPr lang="es-AR" dirty="0" smtClean="0"/>
+          </a:p>
+          <a:p>
+            <a:r>
+              <a:rPr lang="es-AR" dirty="0" smtClean="0"/>
+              <a:t>Si se desea cancelar la compra, aparece un mensaje de confirmación y luego se vuelve al paso anterior.</a:t>
+            </a:r>
+            <a:endParaRPr lang="es-AR" dirty="0" smtClean="0"/>
+          </a:p>
+        </p:txBody>
+      </p:sp>
+      <p:pic>
+        <p:nvPicPr>
+          <p:cNvPr id="3074" name="Picture 2"/>
+          <p:cNvPicPr>
+            <a:picLocks noChangeAspect="1" noChangeArrowheads="1"/>
+          </p:cNvPicPr>
+          <p:nvPr/>
+        </p:nvPicPr>
+        <p:blipFill>
+          <a:blip r:embed="rId2" cstate="print"/>
+          <a:srcRect/>
+          <a:stretch>
+            <a:fillRect/>
+          </a:stretch>
+        </p:blipFill>
+        <p:spPr bwMode="auto">
+          <a:xfrm>
+            <a:off x="182880" y="1272540"/>
+            <a:ext cx="3048000" cy="5410200"/>
+          </a:xfrm>
+          <a:prstGeom prst="rect">
+            <a:avLst/>
+          </a:prstGeom>
+          <a:noFill/>
+          <a:ln w="9525">
+            <a:noFill/>
+            <a:miter lim="800000"/>
+            <a:headEnd/>
+            <a:tailEnd/>
+          </a:ln>
+        </p:spPr>
+      </p:pic>
+      <p:pic>
+        <p:nvPicPr>
+          <p:cNvPr id="3075" name="Picture 3"/>
+          <p:cNvPicPr>
+            <a:picLocks noChangeAspect="1" noChangeArrowheads="1"/>
+          </p:cNvPicPr>
+          <p:nvPr/>
+        </p:nvPicPr>
+        <p:blipFill>
+          <a:blip r:embed="rId3" cstate="print"/>
+          <a:srcRect/>
+          <a:stretch>
+            <a:fillRect/>
+          </a:stretch>
+        </p:blipFill>
+        <p:spPr bwMode="auto">
+          <a:xfrm>
+            <a:off x="3592285" y="1272540"/>
+            <a:ext cx="3048000" cy="5410200"/>
+          </a:xfrm>
+          <a:prstGeom prst="rect">
+            <a:avLst/>
+          </a:prstGeom>
+          <a:noFill/>
+          <a:ln w="9525">
+            <a:noFill/>
+            <a:miter lim="800000"/>
+            <a:headEnd/>
+            <a:tailEnd/>
+          </a:ln>
+        </p:spPr>
+      </p:pic>
+    </p:spTree>
+    <p:extLst>
+      <p:ext uri="{BB962C8B-B14F-4D97-AF65-F5344CB8AC3E}">
+        <p14:creationId xmlns:p14="http://schemas.microsoft.com/office/powerpoint/2010/main" xmlns="" val="3940033879"/>
+      </p:ext>
+    </p:extLst>
+  </p:cSld>
+  <p:clrMapOvr>
+    <a:masterClrMapping/>
+  </p:clrMapOvr>
+  <p:timing>
+    <p:tnLst>
+      <p:par>
+        <p:cTn id="1" dur="indefinite" restart="never" nodeType="tmRoot"/>
+      </p:par>
+    </p:tnLst>
+  </p:timing>
+</p:sld>
+</file>
+
+<file path=ppt/slides/slide21.xml><?xml version="1.0" encoding="utf-8"?>
+<p:sld xmlns:a="http://schemas.openxmlformats.org/drawingml/2006/main" xmlns:r="http://schemas.openxmlformats.org/officeDocument/2006/relationships" xmlns:p="http://schemas.openxmlformats.org/presentationml/2006/main">
+  <p:cSld>
+    <p:spTree>
+      <p:nvGrpSpPr>
+        <p:cNvPr id="1" name=""/>
+        <p:cNvGrpSpPr/>
+        <p:nvPr/>
+      </p:nvGrpSpPr>
+      <p:grpSpPr>
+        <a:xfrm>
+          <a:off x="0" y="0"/>
+          <a:ext cx="0" cy="0"/>
+          <a:chOff x="0" y="0"/>
+          <a:chExt cx="0" cy="0"/>
+        </a:xfrm>
+      </p:grpSpPr>
+      <p:sp>
+        <p:nvSpPr>
+          <p:cNvPr id="2" name="Title 1"/>
+          <p:cNvSpPr>
+            <a:spLocks noGrp="1"/>
+          </p:cNvSpPr>
+          <p:nvPr>
+            <p:ph type="title"/>
+          </p:nvPr>
+        </p:nvSpPr>
+        <p:spPr>
+          <a:xfrm>
+            <a:off x="667130" y="259388"/>
+            <a:ext cx="10772775" cy="1658198"/>
+          </a:xfrm>
+        </p:spPr>
+        <p:txBody>
+          <a:bodyPr/>
+          <a:lstStyle/>
+          <a:p>
+            <a:pPr algn="ctr"/>
+            <a:r>
+              <a:rPr lang="es-AR" dirty="0" smtClean="0"/>
+              <a:t>Oportunidades de Mejora</a:t>
+            </a:r>
+            <a:endParaRPr lang="es-AR" dirty="0"/>
+          </a:p>
+        </p:txBody>
+      </p:sp>
+      <p:sp>
+        <p:nvSpPr>
+          <p:cNvPr id="5" name="2 Marcador de contenido"/>
+          <p:cNvSpPr>
+            <a:spLocks noGrp="1"/>
+          </p:cNvSpPr>
+          <p:nvPr>
+            <p:ph idx="1"/>
+          </p:nvPr>
+        </p:nvSpPr>
+        <p:spPr>
+          <a:xfrm>
+            <a:off x="676656" y="1838036"/>
+            <a:ext cx="10753725" cy="4738255"/>
+          </a:xfrm>
+        </p:spPr>
+        <p:txBody>
+          <a:bodyPr>
+            <a:noAutofit/>
+          </a:bodyPr>
+          <a:lstStyle/>
+          <a:p>
+            <a:pPr lvl="0">
+              <a:buClr>
+                <a:srgbClr val="00B050"/>
+              </a:buClr>
+              <a:buFont typeface="Wingdings" panose="05000000000000000000" pitchFamily="2" charset="2"/>
+              <a:buChar char="ü"/>
+            </a:pPr>
+            <a:r>
+              <a:rPr lang="es-AR" sz="3200" dirty="0" smtClean="0"/>
+              <a:t>Pruebas Funcionales - No usar palabras técnicas, o en inglés. Aclarar con mayor detalle los pasos a seguir.</a:t>
+            </a:r>
+          </a:p>
+          <a:p>
+            <a:pPr lvl="0">
+              <a:buClr>
+                <a:srgbClr val="00B050"/>
+              </a:buClr>
+              <a:buFont typeface="Wingdings" panose="05000000000000000000" pitchFamily="2" charset="2"/>
+              <a:buChar char="ü"/>
+            </a:pPr>
+            <a:endParaRPr lang="es-AR" sz="3200" dirty="0" smtClean="0"/>
+          </a:p>
+          <a:p>
+            <a:pPr lvl="0">
+              <a:buClr>
+                <a:srgbClr val="00B050"/>
+              </a:buClr>
+              <a:buFont typeface="Wingdings" panose="05000000000000000000" pitchFamily="2" charset="2"/>
+              <a:buChar char="ü"/>
+            </a:pPr>
+            <a:r>
+              <a:rPr lang="es-AR" sz="3200" dirty="0" smtClean="0"/>
+              <a:t>Identificación de Tareas – Es positivo tener tareas atómicas, pero se debe tener cuidado para que no cambie mucho el alcance. Faltaron identificar tareas en el comienzo del sprint.</a:t>
+            </a:r>
+          </a:p>
+          <a:p>
+            <a:pPr lvl="0">
+              <a:buClr>
+                <a:srgbClr val="00B050"/>
+              </a:buClr>
+              <a:buFont typeface="Wingdings" panose="05000000000000000000" pitchFamily="2" charset="2"/>
+              <a:buChar char="ü"/>
+            </a:pPr>
+            <a:endParaRPr lang="es-AR" sz="3200" dirty="0" smtClean="0"/>
+          </a:p>
+          <a:p>
+            <a:pPr lvl="0">
+              <a:buClr>
+                <a:srgbClr val="00B050"/>
+              </a:buClr>
+              <a:buFont typeface="Wingdings" panose="05000000000000000000" pitchFamily="2" charset="2"/>
+              <a:buChar char="ü"/>
+            </a:pPr>
+            <a:r>
+              <a:rPr lang="es-AR" sz="3200" dirty="0" smtClean="0"/>
+              <a:t>Documento REST API – Fue fundamental para la comunicación del equipo.</a:t>
+            </a:r>
+          </a:p>
+          <a:p>
+            <a:pPr lvl="3">
+              <a:buClr>
+                <a:srgbClr val="00B050"/>
+              </a:buClr>
+            </a:pPr>
+            <a:endParaRPr lang="es-AR" sz="2600" dirty="0" smtClean="0"/>
+          </a:p>
+        </p:txBody>
+      </p:sp>
+    </p:spTree>
+    <p:extLst>
+      <p:ext uri="{BB962C8B-B14F-4D97-AF65-F5344CB8AC3E}">
+        <p14:creationId xmlns:p14="http://schemas.microsoft.com/office/powerpoint/2010/main" xmlns="" val="4094428205"/>
       </p:ext>
     </p:extLst>
   </p:cSld>
@@ -4556,7 +5880,7 @@
     </p:spTree>
     <p:extLst>
       <p:ext uri="{BB962C8B-B14F-4D97-AF65-F5344CB8AC3E}">
-        <p14:creationId xmlns:p14="http://schemas.microsoft.com/office/powerpoint/2010/main" val="4068815418"/>
+        <p14:creationId xmlns:p14="http://schemas.microsoft.com/office/powerpoint/2010/main" xmlns="" val="4068815418"/>
       </p:ext>
     </p:extLst>
   </p:cSld>
@@ -4656,7 +5980,7 @@
     </p:spTree>
     <p:extLst>
       <p:ext uri="{BB962C8B-B14F-4D97-AF65-F5344CB8AC3E}">
-        <p14:creationId xmlns:p14="http://schemas.microsoft.com/office/powerpoint/2010/main" val="3167588023"/>
+        <p14:creationId xmlns:p14="http://schemas.microsoft.com/office/powerpoint/2010/main" xmlns="" val="3167588023"/>
       </p:ext>
     </p:extLst>
   </p:cSld>
@@ -4730,7 +6054,7 @@
           <p:nvPr/>
         </p:nvPicPr>
         <p:blipFill>
-          <a:blip r:embed="rId2"/>
+          <a:blip r:embed="rId2" cstate="print"/>
           <a:stretch>
             <a:fillRect/>
           </a:stretch>
@@ -4748,7 +6072,7 @@
     </p:spTree>
     <p:extLst>
       <p:ext uri="{BB962C8B-B14F-4D97-AF65-F5344CB8AC3E}">
-        <p14:creationId xmlns:p14="http://schemas.microsoft.com/office/powerpoint/2010/main" val="1441697277"/>
+        <p14:creationId xmlns:p14="http://schemas.microsoft.com/office/powerpoint/2010/main" xmlns="" val="1441697277"/>
       </p:ext>
     </p:extLst>
   </p:cSld>
@@ -4824,10 +6148,10 @@
           </p:nvPr>
         </p:nvPicPr>
         <p:blipFill>
-          <a:blip r:embed="rId2">
+          <a:blip r:embed="rId2" cstate="print">
             <a:extLst>
               <a:ext uri="{28A0092B-C50C-407E-A947-70E740481C1C}">
-                <a14:useLocalDpi xmlns:a14="http://schemas.microsoft.com/office/drawing/2010/main" val="0"/>
+                <a14:useLocalDpi xmlns:a14="http://schemas.microsoft.com/office/drawing/2010/main" xmlns="" val="0"/>
               </a:ext>
             </a:extLst>
           </a:blip>
@@ -4845,7 +6169,7 @@
     </p:spTree>
     <p:extLst>
       <p:ext uri="{BB962C8B-B14F-4D97-AF65-F5344CB8AC3E}">
-        <p14:creationId xmlns:p14="http://schemas.microsoft.com/office/powerpoint/2010/main" val="2970320782"/>
+        <p14:creationId xmlns:p14="http://schemas.microsoft.com/office/powerpoint/2010/main" xmlns="" val="2970320782"/>
       </p:ext>
     </p:extLst>
   </p:cSld>
@@ -4921,10 +6245,10 @@
           </p:nvPr>
         </p:nvPicPr>
         <p:blipFill>
-          <a:blip r:embed="rId2">
+          <a:blip r:embed="rId2" cstate="print">
             <a:extLst>
               <a:ext uri="{28A0092B-C50C-407E-A947-70E740481C1C}">
-                <a14:useLocalDpi xmlns:a14="http://schemas.microsoft.com/office/drawing/2010/main" val="0"/>
+                <a14:useLocalDpi xmlns:a14="http://schemas.microsoft.com/office/drawing/2010/main" xmlns="" val="0"/>
               </a:ext>
             </a:extLst>
           </a:blip>
@@ -4942,7 +6266,7 @@
     </p:spTree>
     <p:extLst>
       <p:ext uri="{BB962C8B-B14F-4D97-AF65-F5344CB8AC3E}">
-        <p14:creationId xmlns:p14="http://schemas.microsoft.com/office/powerpoint/2010/main" val="196631462"/>
+        <p14:creationId xmlns:p14="http://schemas.microsoft.com/office/powerpoint/2010/main" xmlns="" val="196631462"/>
       </p:ext>
     </p:extLst>
   </p:cSld>
@@ -5015,10 +6339,10 @@
           </p:nvPr>
         </p:nvPicPr>
         <p:blipFill>
-          <a:blip r:embed="rId2">
+          <a:blip r:embed="rId2" cstate="print">
             <a:extLst>
               <a:ext uri="{28A0092B-C50C-407E-A947-70E740481C1C}">
-                <a14:useLocalDpi xmlns:a14="http://schemas.microsoft.com/office/drawing/2010/main" val="0"/>
+                <a14:useLocalDpi xmlns:a14="http://schemas.microsoft.com/office/drawing/2010/main" xmlns="" val="0"/>
               </a:ext>
             </a:extLst>
           </a:blip>
@@ -5036,7 +6360,7 @@
     </p:spTree>
     <p:extLst>
       <p:ext uri="{BB962C8B-B14F-4D97-AF65-F5344CB8AC3E}">
-        <p14:creationId xmlns:p14="http://schemas.microsoft.com/office/powerpoint/2010/main" val="1499020164"/>
+        <p14:creationId xmlns:p14="http://schemas.microsoft.com/office/powerpoint/2010/main" xmlns="" val="1499020164"/>
       </p:ext>
     </p:extLst>
   </p:cSld>
@@ -5116,10 +6440,10 @@
           </p:nvPr>
         </p:nvPicPr>
         <p:blipFill>
-          <a:blip r:embed="rId2">
+          <a:blip r:embed="rId2" cstate="print">
             <a:extLst>
               <a:ext uri="{28A0092B-C50C-407E-A947-70E740481C1C}">
-                <a14:useLocalDpi xmlns:a14="http://schemas.microsoft.com/office/drawing/2010/main" val="0"/>
+                <a14:useLocalDpi xmlns:a14="http://schemas.microsoft.com/office/drawing/2010/main" xmlns="" val="0"/>
               </a:ext>
             </a:extLst>
           </a:blip>
@@ -5137,7 +6461,7 @@
     </p:spTree>
     <p:extLst>
       <p:ext uri="{BB962C8B-B14F-4D97-AF65-F5344CB8AC3E}">
-        <p14:creationId xmlns:p14="http://schemas.microsoft.com/office/powerpoint/2010/main" val="1809588348"/>
+        <p14:creationId xmlns:p14="http://schemas.microsoft.com/office/powerpoint/2010/main" xmlns="" val="1809588348"/>
       </p:ext>
     </p:extLst>
   </p:cSld>
@@ -5385,7 +6709,7 @@
   <a:extraClrSchemeLst/>
   <a:extLst>
     <a:ext uri="{05A4C25C-085E-4340-85A3-A5531E510DB2}">
-      <thm15:themeFamily xmlns:thm15="http://schemas.microsoft.com/office/thememl/2012/main" name="Metropolitan" id="{4C5440D6-04D2-4954-96CF-F251137069B2}" vid="{79CFCA13-9412-4290-BB4B-85112F88857B}"/>
+      <thm15:themeFamily xmlns:thm15="http://schemas.microsoft.com/office/thememl/2012/main" xmlns="" name="Metropolitan" id="{4C5440D6-04D2-4954-96CF-F251137069B2}" vid="{79CFCA13-9412-4290-BB4B-85112F88857B}"/>
     </a:ext>
   </a:extLst>
 </a:theme>

</xml_diff>

<commit_message>
# Added Burndown Chart
</commit_message>
<xml_diff>
--- a/docs/Reuniones/Sprint 4/Reunion Formal 20131104/Reunion Formal.pptx
+++ b/docs/Reuniones/Sprint 4/Reunion Formal 20131104/Reunion Formal.pptx
@@ -126,7 +126,7 @@
   </p:defaultTextStyle>
   <p:extLst>
     <p:ext uri="{EFAFB233-063F-42B5-8137-9DF3F51BA10A}">
-      <p15:sldGuideLst xmlns:p15="http://schemas.microsoft.com/office/powerpoint/2012/main" xmlns="">
+      <p15:sldGuideLst xmlns:p15="http://schemas.microsoft.com/office/powerpoint/2012/main">
         <p15:guide id="1" orient="horz" pos="2160">
           <p15:clr>
             <a:srgbClr val="A4A3A4"/>
@@ -407,7 +407,7 @@
             <a:fld id="{146C01B7-3F94-48E0-9801-4B4D2FF8F9CB}" type="slidenum">
               <a:rPr lang="es-AR" smtClean="0"/>
               <a:pPr/>
-              <a:t>‹Nº›</a:t>
+              <a:t>‹#›</a:t>
             </a:fld>
             <a:endParaRPr lang="es-AR"/>
           </a:p>
@@ -416,7 +416,7 @@
     </p:spTree>
     <p:extLst>
       <p:ext uri="{BB962C8B-B14F-4D97-AF65-F5344CB8AC3E}">
-        <p14:creationId xmlns:p14="http://schemas.microsoft.com/office/powerpoint/2010/main" xmlns="" val="783670883"/>
+        <p14:creationId xmlns:p14="http://schemas.microsoft.com/office/powerpoint/2010/main" val="783670883"/>
       </p:ext>
     </p:extLst>
   </p:cSld>
@@ -579,7 +579,7 @@
             <a:fld id="{146C01B7-3F94-48E0-9801-4B4D2FF8F9CB}" type="slidenum">
               <a:rPr lang="es-AR" smtClean="0"/>
               <a:pPr/>
-              <a:t>‹Nº›</a:t>
+              <a:t>‹#›</a:t>
             </a:fld>
             <a:endParaRPr lang="es-AR"/>
           </a:p>
@@ -588,7 +588,7 @@
     </p:spTree>
     <p:extLst>
       <p:ext uri="{BB962C8B-B14F-4D97-AF65-F5344CB8AC3E}">
-        <p14:creationId xmlns:p14="http://schemas.microsoft.com/office/powerpoint/2010/main" xmlns="" val="3362801827"/>
+        <p14:creationId xmlns:p14="http://schemas.microsoft.com/office/powerpoint/2010/main" val="3362801827"/>
       </p:ext>
     </p:extLst>
   </p:cSld>
@@ -761,7 +761,7 @@
             <a:fld id="{146C01B7-3F94-48E0-9801-4B4D2FF8F9CB}" type="slidenum">
               <a:rPr lang="es-AR" smtClean="0"/>
               <a:pPr/>
-              <a:t>‹Nº›</a:t>
+              <a:t>‹#›</a:t>
             </a:fld>
             <a:endParaRPr lang="es-AR"/>
           </a:p>
@@ -770,7 +770,7 @@
     </p:spTree>
     <p:extLst>
       <p:ext uri="{BB962C8B-B14F-4D97-AF65-F5344CB8AC3E}">
-        <p14:creationId xmlns:p14="http://schemas.microsoft.com/office/powerpoint/2010/main" xmlns="" val="1559089465"/>
+        <p14:creationId xmlns:p14="http://schemas.microsoft.com/office/powerpoint/2010/main" val="1559089465"/>
       </p:ext>
     </p:extLst>
   </p:cSld>
@@ -933,7 +933,7 @@
             <a:fld id="{146C01B7-3F94-48E0-9801-4B4D2FF8F9CB}" type="slidenum">
               <a:rPr lang="es-AR" smtClean="0"/>
               <a:pPr/>
-              <a:t>‹Nº›</a:t>
+              <a:t>‹#›</a:t>
             </a:fld>
             <a:endParaRPr lang="es-AR"/>
           </a:p>
@@ -942,7 +942,7 @@
     </p:spTree>
     <p:extLst>
       <p:ext uri="{BB962C8B-B14F-4D97-AF65-F5344CB8AC3E}">
-        <p14:creationId xmlns:p14="http://schemas.microsoft.com/office/powerpoint/2010/main" xmlns="" val="4250054912"/>
+        <p14:creationId xmlns:p14="http://schemas.microsoft.com/office/powerpoint/2010/main" val="4250054912"/>
       </p:ext>
     </p:extLst>
   </p:cSld>
@@ -1191,7 +1191,7 @@
             <a:fld id="{146C01B7-3F94-48E0-9801-4B4D2FF8F9CB}" type="slidenum">
               <a:rPr lang="es-AR" smtClean="0"/>
               <a:pPr/>
-              <a:t>‹Nº›</a:t>
+              <a:t>‹#›</a:t>
             </a:fld>
             <a:endParaRPr lang="es-AR"/>
           </a:p>
@@ -1200,7 +1200,7 @@
     </p:spTree>
     <p:extLst>
       <p:ext uri="{BB962C8B-B14F-4D97-AF65-F5344CB8AC3E}">
-        <p14:creationId xmlns:p14="http://schemas.microsoft.com/office/powerpoint/2010/main" xmlns="" val="2105287886"/>
+        <p14:creationId xmlns:p14="http://schemas.microsoft.com/office/powerpoint/2010/main" val="2105287886"/>
       </p:ext>
     </p:extLst>
   </p:cSld>
@@ -1481,7 +1481,7 @@
             <a:fld id="{146C01B7-3F94-48E0-9801-4B4D2FF8F9CB}" type="slidenum">
               <a:rPr lang="es-AR" smtClean="0"/>
               <a:pPr/>
-              <a:t>‹Nº›</a:t>
+              <a:t>‹#›</a:t>
             </a:fld>
             <a:endParaRPr lang="es-AR"/>
           </a:p>
@@ -1490,7 +1490,7 @@
     </p:spTree>
     <p:extLst>
       <p:ext uri="{BB962C8B-B14F-4D97-AF65-F5344CB8AC3E}">
-        <p14:creationId xmlns:p14="http://schemas.microsoft.com/office/powerpoint/2010/main" xmlns="" val="2999552341"/>
+        <p14:creationId xmlns:p14="http://schemas.microsoft.com/office/powerpoint/2010/main" val="2999552341"/>
       </p:ext>
     </p:extLst>
   </p:cSld>
@@ -1921,7 +1921,7 @@
             <a:fld id="{146C01B7-3F94-48E0-9801-4B4D2FF8F9CB}" type="slidenum">
               <a:rPr lang="es-AR" smtClean="0"/>
               <a:pPr/>
-              <a:t>‹Nº›</a:t>
+              <a:t>‹#›</a:t>
             </a:fld>
             <a:endParaRPr lang="es-AR"/>
           </a:p>
@@ -1930,7 +1930,7 @@
     </p:spTree>
     <p:extLst>
       <p:ext uri="{BB962C8B-B14F-4D97-AF65-F5344CB8AC3E}">
-        <p14:creationId xmlns:p14="http://schemas.microsoft.com/office/powerpoint/2010/main" xmlns="" val="375881571"/>
+        <p14:creationId xmlns:p14="http://schemas.microsoft.com/office/powerpoint/2010/main" val="375881571"/>
       </p:ext>
     </p:extLst>
   </p:cSld>
@@ -2041,7 +2041,7 @@
             <a:fld id="{146C01B7-3F94-48E0-9801-4B4D2FF8F9CB}" type="slidenum">
               <a:rPr lang="es-AR" smtClean="0"/>
               <a:pPr/>
-              <a:t>‹Nº›</a:t>
+              <a:t>‹#›</a:t>
             </a:fld>
             <a:endParaRPr lang="es-AR"/>
           </a:p>
@@ -2050,7 +2050,7 @@
     </p:spTree>
     <p:extLst>
       <p:ext uri="{BB962C8B-B14F-4D97-AF65-F5344CB8AC3E}">
-        <p14:creationId xmlns:p14="http://schemas.microsoft.com/office/powerpoint/2010/main" xmlns="" val="1095840064"/>
+        <p14:creationId xmlns:p14="http://schemas.microsoft.com/office/powerpoint/2010/main" val="1095840064"/>
       </p:ext>
     </p:extLst>
   </p:cSld>
@@ -2138,7 +2138,7 @@
             <a:fld id="{146C01B7-3F94-48E0-9801-4B4D2FF8F9CB}" type="slidenum">
               <a:rPr lang="es-AR" smtClean="0"/>
               <a:pPr/>
-              <a:t>‹Nº›</a:t>
+              <a:t>‹#›</a:t>
             </a:fld>
             <a:endParaRPr lang="es-AR"/>
           </a:p>
@@ -2147,7 +2147,7 @@
     </p:spTree>
     <p:extLst>
       <p:ext uri="{BB962C8B-B14F-4D97-AF65-F5344CB8AC3E}">
-        <p14:creationId xmlns:p14="http://schemas.microsoft.com/office/powerpoint/2010/main" xmlns="" val="1121564704"/>
+        <p14:creationId xmlns:p14="http://schemas.microsoft.com/office/powerpoint/2010/main" val="1121564704"/>
       </p:ext>
     </p:extLst>
   </p:cSld>
@@ -2506,7 +2506,7 @@
             <a:fld id="{146C01B7-3F94-48E0-9801-4B4D2FF8F9CB}" type="slidenum">
               <a:rPr lang="es-AR" smtClean="0"/>
               <a:pPr/>
-              <a:t>‹Nº›</a:t>
+              <a:t>‹#›</a:t>
             </a:fld>
             <a:endParaRPr lang="es-AR"/>
           </a:p>
@@ -2515,7 +2515,7 @@
     </p:spTree>
     <p:extLst>
       <p:ext uri="{BB962C8B-B14F-4D97-AF65-F5344CB8AC3E}">
-        <p14:creationId xmlns:p14="http://schemas.microsoft.com/office/powerpoint/2010/main" xmlns="" val="3858346437"/>
+        <p14:creationId xmlns:p14="http://schemas.microsoft.com/office/powerpoint/2010/main" val="3858346437"/>
       </p:ext>
     </p:extLst>
   </p:cSld>
@@ -2834,7 +2834,7 @@
             <a:fld id="{146C01B7-3F94-48E0-9801-4B4D2FF8F9CB}" type="slidenum">
               <a:rPr lang="es-AR" smtClean="0"/>
               <a:pPr/>
-              <a:t>‹Nº›</a:t>
+              <a:t>‹#›</a:t>
             </a:fld>
             <a:endParaRPr lang="es-AR"/>
           </a:p>
@@ -2843,7 +2843,7 @@
     </p:spTree>
     <p:extLst>
       <p:ext uri="{BB962C8B-B14F-4D97-AF65-F5344CB8AC3E}">
-        <p14:creationId xmlns:p14="http://schemas.microsoft.com/office/powerpoint/2010/main" xmlns="" val="1103777031"/>
+        <p14:creationId xmlns:p14="http://schemas.microsoft.com/office/powerpoint/2010/main" val="1103777031"/>
       </p:ext>
     </p:extLst>
   </p:cSld>
@@ -3089,7 +3089,7 @@
             <a:fld id="{146C01B7-3F94-48E0-9801-4B4D2FF8F9CB}" type="slidenum">
               <a:rPr lang="es-AR" smtClean="0"/>
               <a:pPr/>
-              <a:t>‹Nº›</a:t>
+              <a:t>‹#›</a:t>
             </a:fld>
             <a:endParaRPr lang="es-AR"/>
           </a:p>
@@ -3098,7 +3098,7 @@
     </p:spTree>
     <p:extLst>
       <p:ext uri="{BB962C8B-B14F-4D97-AF65-F5344CB8AC3E}">
-        <p14:creationId xmlns:p14="http://schemas.microsoft.com/office/powerpoint/2010/main" xmlns="" val="1785626056"/>
+        <p14:creationId xmlns:p14="http://schemas.microsoft.com/office/powerpoint/2010/main" val="1785626056"/>
       </p:ext>
     </p:extLst>
   </p:cSld>
@@ -3613,7 +3613,7 @@
     </p:spTree>
     <p:extLst>
       <p:ext uri="{BB962C8B-B14F-4D97-AF65-F5344CB8AC3E}">
-        <p14:creationId xmlns:p14="http://schemas.microsoft.com/office/powerpoint/2010/main" xmlns="" val="4103899004"/>
+        <p14:creationId xmlns:p14="http://schemas.microsoft.com/office/powerpoint/2010/main" val="4103899004"/>
       </p:ext>
     </p:extLst>
   </p:cSld>
@@ -3696,7 +3696,7 @@
           <a:blip r:embed="rId2" cstate="print">
             <a:extLst>
               <a:ext uri="{28A0092B-C50C-407E-A947-70E740481C1C}">
-                <a14:useLocalDpi xmlns:a14="http://schemas.microsoft.com/office/drawing/2010/main" xmlns="" val="0"/>
+                <a14:useLocalDpi xmlns:a14="http://schemas.microsoft.com/office/drawing/2010/main" val="0"/>
               </a:ext>
             </a:extLst>
           </a:blip>
@@ -3714,7 +3714,7 @@
     </p:spTree>
     <p:extLst>
       <p:ext uri="{BB962C8B-B14F-4D97-AF65-F5344CB8AC3E}">
-        <p14:creationId xmlns:p14="http://schemas.microsoft.com/office/powerpoint/2010/main" xmlns="" val="546436012"/>
+        <p14:creationId xmlns:p14="http://schemas.microsoft.com/office/powerpoint/2010/main" val="546436012"/>
       </p:ext>
     </p:extLst>
   </p:cSld>
@@ -3797,7 +3797,7 @@
           <a:blip r:embed="rId2" cstate="print">
             <a:extLst>
               <a:ext uri="{28A0092B-C50C-407E-A947-70E740481C1C}">
-                <a14:useLocalDpi xmlns:a14="http://schemas.microsoft.com/office/drawing/2010/main" xmlns="" val="0"/>
+                <a14:useLocalDpi xmlns:a14="http://schemas.microsoft.com/office/drawing/2010/main" val="0"/>
               </a:ext>
             </a:extLst>
           </a:blip>
@@ -3815,7 +3815,7 @@
     </p:spTree>
     <p:extLst>
       <p:ext uri="{BB962C8B-B14F-4D97-AF65-F5344CB8AC3E}">
-        <p14:creationId xmlns:p14="http://schemas.microsoft.com/office/powerpoint/2010/main" xmlns="" val="2468076519"/>
+        <p14:creationId xmlns:p14="http://schemas.microsoft.com/office/powerpoint/2010/main" val="2468076519"/>
       </p:ext>
     </p:extLst>
   </p:cSld>
@@ -3898,7 +3898,7 @@
           <a:blip r:embed="rId2" cstate="print">
             <a:extLst>
               <a:ext uri="{28A0092B-C50C-407E-A947-70E740481C1C}">
-                <a14:useLocalDpi xmlns:a14="http://schemas.microsoft.com/office/drawing/2010/main" xmlns="" val="0"/>
+                <a14:useLocalDpi xmlns:a14="http://schemas.microsoft.com/office/drawing/2010/main" val="0"/>
               </a:ext>
             </a:extLst>
           </a:blip>
@@ -3916,7 +3916,7 @@
     </p:spTree>
     <p:extLst>
       <p:ext uri="{BB962C8B-B14F-4D97-AF65-F5344CB8AC3E}">
-        <p14:creationId xmlns:p14="http://schemas.microsoft.com/office/powerpoint/2010/main" xmlns="" val="1959318754"/>
+        <p14:creationId xmlns:p14="http://schemas.microsoft.com/office/powerpoint/2010/main" val="1959318754"/>
       </p:ext>
     </p:extLst>
   </p:cSld>
@@ -3999,7 +3999,7 @@
           <a:blip r:embed="rId2" cstate="print">
             <a:extLst>
               <a:ext uri="{28A0092B-C50C-407E-A947-70E740481C1C}">
-                <a14:useLocalDpi xmlns:a14="http://schemas.microsoft.com/office/drawing/2010/main" xmlns="" val="0"/>
+                <a14:useLocalDpi xmlns:a14="http://schemas.microsoft.com/office/drawing/2010/main" val="0"/>
               </a:ext>
             </a:extLst>
           </a:blip>
@@ -4017,7 +4017,7 @@
     </p:spTree>
     <p:extLst>
       <p:ext uri="{BB962C8B-B14F-4D97-AF65-F5344CB8AC3E}">
-        <p14:creationId xmlns:p14="http://schemas.microsoft.com/office/powerpoint/2010/main" xmlns="" val="3940033879"/>
+        <p14:creationId xmlns:p14="http://schemas.microsoft.com/office/powerpoint/2010/main" val="3940033879"/>
       </p:ext>
     </p:extLst>
   </p:cSld>
@@ -4107,12 +4107,12 @@
               <a:t>Estas imágenes muestran el </a:t>
             </a:r>
             <a:r>
-              <a:rPr lang="es-AR" dirty="0" err="1" smtClean="0"/>
-              <a:t>menu</a:t>
-            </a:r>
-            <a:r>
               <a:rPr lang="es-AR" dirty="0" smtClean="0"/>
-              <a:t> del detalle del usuario.</a:t>
+              <a:t>menú </a:t>
+            </a:r>
+            <a:r>
+              <a:rPr lang="es-AR" dirty="0" smtClean="0"/>
+              <a:t>del detalle del usuario.</a:t>
             </a:r>
           </a:p>
           <a:p>
@@ -4231,7 +4231,7 @@
     </p:spTree>
     <p:extLst>
       <p:ext uri="{BB962C8B-B14F-4D97-AF65-F5344CB8AC3E}">
-        <p14:creationId xmlns:p14="http://schemas.microsoft.com/office/powerpoint/2010/main" xmlns="" val="3940033879"/>
+        <p14:creationId xmlns:p14="http://schemas.microsoft.com/office/powerpoint/2010/main" val="3940033879"/>
       </p:ext>
     </p:extLst>
   </p:cSld>
@@ -4459,7 +4459,7 @@
     </p:spTree>
     <p:extLst>
       <p:ext uri="{BB962C8B-B14F-4D97-AF65-F5344CB8AC3E}">
-        <p14:creationId xmlns:p14="http://schemas.microsoft.com/office/powerpoint/2010/main" xmlns="" val="3940033879"/>
+        <p14:creationId xmlns:p14="http://schemas.microsoft.com/office/powerpoint/2010/main" val="3940033879"/>
       </p:ext>
     </p:extLst>
   </p:cSld>
@@ -4596,7 +4596,7 @@
     </p:spTree>
     <p:extLst>
       <p:ext uri="{BB962C8B-B14F-4D97-AF65-F5344CB8AC3E}">
-        <p14:creationId xmlns:p14="http://schemas.microsoft.com/office/powerpoint/2010/main" xmlns="" val="3940033879"/>
+        <p14:creationId xmlns:p14="http://schemas.microsoft.com/office/powerpoint/2010/main" val="3940033879"/>
       </p:ext>
     </p:extLst>
   </p:cSld>
@@ -4780,7 +4780,7 @@
     </p:spTree>
     <p:extLst>
       <p:ext uri="{BB962C8B-B14F-4D97-AF65-F5344CB8AC3E}">
-        <p14:creationId xmlns:p14="http://schemas.microsoft.com/office/powerpoint/2010/main" xmlns="" val="3940033879"/>
+        <p14:creationId xmlns:p14="http://schemas.microsoft.com/office/powerpoint/2010/main" val="3940033879"/>
       </p:ext>
     </p:extLst>
   </p:cSld>
@@ -4872,15 +4872,7 @@
             </a:pPr>
             <a:r>
               <a:rPr lang="es-AR" dirty="0" smtClean="0"/>
-              <a:t>En la ventana de selección </a:t>
-            </a:r>
-            <a:r>
-              <a:rPr lang="es-AR" dirty="0" smtClean="0"/>
-              <a:t>de butacas </a:t>
-            </a:r>
-            <a:r>
-              <a:rPr lang="es-AR" dirty="0" smtClean="0"/>
-              <a:t>(primer paso de la compra/reserva de entradas) podemos ver el mapa de la sala con:</a:t>
+              <a:t>En la ventana de selección de butacas (primer paso de la compra/reserva de entradas) podemos ver el mapa de la sala con:</a:t>
             </a:r>
           </a:p>
           <a:p>
@@ -4930,11 +4922,7 @@
             </a:pPr>
             <a:r>
               <a:rPr lang="es-AR" dirty="0" smtClean="0"/>
-              <a:t>L</a:t>
-            </a:r>
-            <a:r>
-              <a:rPr lang="es-AR" dirty="0" smtClean="0"/>
-              <a:t>a cantidad de butacas seleccionadas.</a:t>
+              <a:t>La cantidad de butacas seleccionadas.</a:t>
             </a:r>
             <a:endParaRPr lang="es-AR" dirty="0"/>
           </a:p>
@@ -4975,7 +4963,7 @@
     </p:spTree>
     <p:extLst>
       <p:ext uri="{BB962C8B-B14F-4D97-AF65-F5344CB8AC3E}">
-        <p14:creationId xmlns:p14="http://schemas.microsoft.com/office/powerpoint/2010/main" xmlns="" val="3940033879"/>
+        <p14:creationId xmlns:p14="http://schemas.microsoft.com/office/powerpoint/2010/main" val="3940033879"/>
       </p:ext>
     </p:extLst>
   </p:cSld>
@@ -5065,21 +5053,8 @@
             </a:pPr>
             <a:r>
               <a:rPr lang="es-AR" dirty="0" smtClean="0"/>
-              <a:t>En la ventana de selección de </a:t>
-            </a:r>
-            <a:r>
-              <a:rPr lang="es-AR" dirty="0" smtClean="0"/>
-              <a:t>promociones (segundo paso </a:t>
-            </a:r>
-            <a:r>
-              <a:rPr lang="es-AR" dirty="0" smtClean="0"/>
-              <a:t>de la compra/reserva de entradas) </a:t>
-            </a:r>
-            <a:r>
-              <a:rPr lang="es-AR" dirty="0" smtClean="0"/>
-              <a:t>podemos:</a:t>
-            </a:r>
-            <a:endParaRPr lang="es-AR" dirty="0" smtClean="0"/>
+              <a:t>En la ventana de selección de promociones (segundo paso de la compra/reserva de entradas) podemos:</a:t>
+            </a:r>
           </a:p>
           <a:p>
             <a:pPr lvl="1">
@@ -5110,7 +5085,6 @@
               <a:rPr lang="es-AR" dirty="0" smtClean="0"/>
               <a:t>Los botones de las acciones compra, reserva y cancelación de la operación.</a:t>
             </a:r>
-            <a:endParaRPr lang="es-AR" dirty="0" smtClean="0"/>
           </a:p>
           <a:p>
             <a:endParaRPr lang="es-AR" dirty="0" smtClean="0"/>
@@ -5159,7 +5133,7 @@
     </p:spTree>
     <p:extLst>
       <p:ext uri="{BB962C8B-B14F-4D97-AF65-F5344CB8AC3E}">
-        <p14:creationId xmlns:p14="http://schemas.microsoft.com/office/powerpoint/2010/main" xmlns="" val="3940033879"/>
+        <p14:creationId xmlns:p14="http://schemas.microsoft.com/office/powerpoint/2010/main" val="3940033879"/>
       </p:ext>
     </p:extLst>
   </p:cSld>
@@ -5363,7 +5337,7 @@
     </p:spTree>
     <p:extLst>
       <p:ext uri="{BB962C8B-B14F-4D97-AF65-F5344CB8AC3E}">
-        <p14:creationId xmlns:p14="http://schemas.microsoft.com/office/powerpoint/2010/main" xmlns="" val="3019863904"/>
+        <p14:creationId xmlns:p14="http://schemas.microsoft.com/office/powerpoint/2010/main" val="3019863904"/>
       </p:ext>
     </p:extLst>
   </p:cSld>
@@ -5467,7 +5441,6 @@
               <a:rPr lang="es-AR" dirty="0" smtClean="0"/>
               <a:t>Si se desea cancelar la compra, aparece un mensaje de confirmación y luego se vuelve al paso anterior.</a:t>
             </a:r>
-            <a:endParaRPr lang="es-AR" dirty="0" smtClean="0"/>
           </a:p>
         </p:txBody>
       </p:sp>
@@ -5538,7 +5511,7 @@
     </p:spTree>
     <p:extLst>
       <p:ext uri="{BB962C8B-B14F-4D97-AF65-F5344CB8AC3E}">
-        <p14:creationId xmlns:p14="http://schemas.microsoft.com/office/powerpoint/2010/main" xmlns="" val="3940033879"/>
+        <p14:creationId xmlns:p14="http://schemas.microsoft.com/office/powerpoint/2010/main" val="3940033879"/>
       </p:ext>
     </p:extLst>
   </p:cSld>
@@ -5694,7 +5667,7 @@
     </p:spTree>
     <p:extLst>
       <p:ext uri="{BB962C8B-B14F-4D97-AF65-F5344CB8AC3E}">
-        <p14:creationId xmlns:p14="http://schemas.microsoft.com/office/powerpoint/2010/main" xmlns="" val="4094428205"/>
+        <p14:creationId xmlns:p14="http://schemas.microsoft.com/office/powerpoint/2010/main" val="4094428205"/>
       </p:ext>
     </p:extLst>
   </p:cSld>
@@ -5880,7 +5853,7 @@
     </p:spTree>
     <p:extLst>
       <p:ext uri="{BB962C8B-B14F-4D97-AF65-F5344CB8AC3E}">
-        <p14:creationId xmlns:p14="http://schemas.microsoft.com/office/powerpoint/2010/main" xmlns="" val="4068815418"/>
+        <p14:creationId xmlns:p14="http://schemas.microsoft.com/office/powerpoint/2010/main" val="4068815418"/>
       </p:ext>
     </p:extLst>
   </p:cSld>
@@ -5977,10 +5950,40 @@
           </a:p>
         </p:txBody>
       </p:sp>
+      <p:pic>
+        <p:nvPicPr>
+          <p:cNvPr id="3" name="Picture 2"/>
+          <p:cNvPicPr>
+            <a:picLocks noChangeAspect="1"/>
+          </p:cNvPicPr>
+          <p:nvPr/>
+        </p:nvPicPr>
+        <p:blipFill>
+          <a:blip r:embed="rId2">
+            <a:extLst>
+              <a:ext uri="{28A0092B-C50C-407E-A947-70E740481C1C}">
+                <a14:useLocalDpi xmlns:a14="http://schemas.microsoft.com/office/drawing/2010/main" val="0"/>
+              </a:ext>
+            </a:extLst>
+          </a:blip>
+          <a:stretch>
+            <a:fillRect/>
+          </a:stretch>
+        </p:blipFill>
+        <p:spPr>
+          <a:xfrm>
+            <a:off x="188450" y="1836903"/>
+            <a:ext cx="11757891" cy="4361214"/>
+          </a:xfrm>
+          <a:prstGeom prst="rect">
+            <a:avLst/>
+          </a:prstGeom>
+        </p:spPr>
+      </p:pic>
     </p:spTree>
     <p:extLst>
       <p:ext uri="{BB962C8B-B14F-4D97-AF65-F5344CB8AC3E}">
-        <p14:creationId xmlns:p14="http://schemas.microsoft.com/office/powerpoint/2010/main" xmlns="" val="3167588023"/>
+        <p14:creationId xmlns:p14="http://schemas.microsoft.com/office/powerpoint/2010/main" val="3167588023"/>
       </p:ext>
     </p:extLst>
   </p:cSld>
@@ -6026,7 +6029,7 @@
         </p:nvSpPr>
         <p:spPr>
           <a:xfrm>
-            <a:off x="2024034" y="142852"/>
+            <a:off x="2024034" y="50492"/>
             <a:ext cx="8229600" cy="1344203"/>
           </a:xfrm>
         </p:spPr>
@@ -6061,7 +6064,7 @@
         </p:blipFill>
         <p:spPr>
           <a:xfrm>
-            <a:off x="3962643" y="1134191"/>
+            <a:off x="3962643" y="1069539"/>
             <a:ext cx="4352381" cy="5723809"/>
           </a:xfrm>
           <a:prstGeom prst="rect">
@@ -6072,7 +6075,7 @@
     </p:spTree>
     <p:extLst>
       <p:ext uri="{BB962C8B-B14F-4D97-AF65-F5344CB8AC3E}">
-        <p14:creationId xmlns:p14="http://schemas.microsoft.com/office/powerpoint/2010/main" xmlns="" val="1441697277"/>
+        <p14:creationId xmlns:p14="http://schemas.microsoft.com/office/powerpoint/2010/main" val="1441697277"/>
       </p:ext>
     </p:extLst>
   </p:cSld>
@@ -6151,7 +6154,7 @@
           <a:blip r:embed="rId2" cstate="print">
             <a:extLst>
               <a:ext uri="{28A0092B-C50C-407E-A947-70E740481C1C}">
-                <a14:useLocalDpi xmlns:a14="http://schemas.microsoft.com/office/drawing/2010/main" xmlns="" val="0"/>
+                <a14:useLocalDpi xmlns:a14="http://schemas.microsoft.com/office/drawing/2010/main" val="0"/>
               </a:ext>
             </a:extLst>
           </a:blip>
@@ -6169,7 +6172,7 @@
     </p:spTree>
     <p:extLst>
       <p:ext uri="{BB962C8B-B14F-4D97-AF65-F5344CB8AC3E}">
-        <p14:creationId xmlns:p14="http://schemas.microsoft.com/office/powerpoint/2010/main" xmlns="" val="2970320782"/>
+        <p14:creationId xmlns:p14="http://schemas.microsoft.com/office/powerpoint/2010/main" val="2970320782"/>
       </p:ext>
     </p:extLst>
   </p:cSld>
@@ -6248,7 +6251,7 @@
           <a:blip r:embed="rId2" cstate="print">
             <a:extLst>
               <a:ext uri="{28A0092B-C50C-407E-A947-70E740481C1C}">
-                <a14:useLocalDpi xmlns:a14="http://schemas.microsoft.com/office/drawing/2010/main" xmlns="" val="0"/>
+                <a14:useLocalDpi xmlns:a14="http://schemas.microsoft.com/office/drawing/2010/main" val="0"/>
               </a:ext>
             </a:extLst>
           </a:blip>
@@ -6266,7 +6269,7 @@
     </p:spTree>
     <p:extLst>
       <p:ext uri="{BB962C8B-B14F-4D97-AF65-F5344CB8AC3E}">
-        <p14:creationId xmlns:p14="http://schemas.microsoft.com/office/powerpoint/2010/main" xmlns="" val="196631462"/>
+        <p14:creationId xmlns:p14="http://schemas.microsoft.com/office/powerpoint/2010/main" val="196631462"/>
       </p:ext>
     </p:extLst>
   </p:cSld>
@@ -6342,7 +6345,7 @@
           <a:blip r:embed="rId2" cstate="print">
             <a:extLst>
               <a:ext uri="{28A0092B-C50C-407E-A947-70E740481C1C}">
-                <a14:useLocalDpi xmlns:a14="http://schemas.microsoft.com/office/drawing/2010/main" xmlns="" val="0"/>
+                <a14:useLocalDpi xmlns:a14="http://schemas.microsoft.com/office/drawing/2010/main" val="0"/>
               </a:ext>
             </a:extLst>
           </a:blip>
@@ -6360,7 +6363,7 @@
     </p:spTree>
     <p:extLst>
       <p:ext uri="{BB962C8B-B14F-4D97-AF65-F5344CB8AC3E}">
-        <p14:creationId xmlns:p14="http://schemas.microsoft.com/office/powerpoint/2010/main" xmlns="" val="1499020164"/>
+        <p14:creationId xmlns:p14="http://schemas.microsoft.com/office/powerpoint/2010/main" val="1499020164"/>
       </p:ext>
     </p:extLst>
   </p:cSld>
@@ -6443,7 +6446,7 @@
           <a:blip r:embed="rId2" cstate="print">
             <a:extLst>
               <a:ext uri="{28A0092B-C50C-407E-A947-70E740481C1C}">
-                <a14:useLocalDpi xmlns:a14="http://schemas.microsoft.com/office/drawing/2010/main" xmlns="" val="0"/>
+                <a14:useLocalDpi xmlns:a14="http://schemas.microsoft.com/office/drawing/2010/main" val="0"/>
               </a:ext>
             </a:extLst>
           </a:blip>
@@ -6461,7 +6464,7 @@
     </p:spTree>
     <p:extLst>
       <p:ext uri="{BB962C8B-B14F-4D97-AF65-F5344CB8AC3E}">
-        <p14:creationId xmlns:p14="http://schemas.microsoft.com/office/powerpoint/2010/main" xmlns="" val="1809588348"/>
+        <p14:creationId xmlns:p14="http://schemas.microsoft.com/office/powerpoint/2010/main" val="1809588348"/>
       </p:ext>
     </p:extLst>
   </p:cSld>
@@ -6709,7 +6712,7 @@
   <a:extraClrSchemeLst/>
   <a:extLst>
     <a:ext uri="{05A4C25C-085E-4340-85A3-A5531E510DB2}">
-      <thm15:themeFamily xmlns:thm15="http://schemas.microsoft.com/office/thememl/2012/main" xmlns="" name="Metropolitan" id="{4C5440D6-04D2-4954-96CF-F251137069B2}" vid="{79CFCA13-9412-4290-BB4B-85112F88857B}"/>
+      <thm15:themeFamily xmlns:thm15="http://schemas.microsoft.com/office/thememl/2012/main" name="Metropolitan" id="{4C5440D6-04D2-4954-96CF-F251137069B2}" vid="{79CFCA13-9412-4290-BB4B-85112F88857B}"/>
     </a:ext>
   </a:extLst>
 </a:theme>

</xml_diff>